<commit_message>
add GetObjectPosition and fixed some bugs like error in first simulation step.
</commit_message>
<xml_diff>
--- a/docs/slide.pptx
+++ b/docs/slide.pptx
@@ -5,18 +5,27 @@
     <p:sldMasterId id="2147483648" r:id="rId1"/>
   </p:sldMasterIdLst>
   <p:sldIdLst>
-    <p:sldId id="257" r:id="rId2"/>
-    <p:sldId id="258" r:id="rId3"/>
-    <p:sldId id="259" r:id="rId4"/>
-    <p:sldId id="260" r:id="rId5"/>
-    <p:sldId id="261" r:id="rId6"/>
-    <p:sldId id="262" r:id="rId7"/>
-    <p:sldId id="263" r:id="rId8"/>
-    <p:sldId id="264" r:id="rId9"/>
-    <p:sldId id="265" r:id="rId10"/>
-    <p:sldId id="266" r:id="rId11"/>
-    <p:sldId id="267" r:id="rId12"/>
-    <p:sldId id="268" r:id="rId13"/>
+    <p:sldId id="269" r:id="rId2"/>
+    <p:sldId id="257" r:id="rId3"/>
+    <p:sldId id="258" r:id="rId4"/>
+    <p:sldId id="259" r:id="rId5"/>
+    <p:sldId id="260" r:id="rId6"/>
+    <p:sldId id="261" r:id="rId7"/>
+    <p:sldId id="262" r:id="rId8"/>
+    <p:sldId id="263" r:id="rId9"/>
+    <p:sldId id="264" r:id="rId10"/>
+    <p:sldId id="265" r:id="rId11"/>
+    <p:sldId id="266" r:id="rId12"/>
+    <p:sldId id="267" r:id="rId13"/>
+    <p:sldId id="268" r:id="rId14"/>
+    <p:sldId id="270" r:id="rId15"/>
+    <p:sldId id="280" r:id="rId16"/>
+    <p:sldId id="271" r:id="rId17"/>
+    <p:sldId id="277" r:id="rId18"/>
+    <p:sldId id="276" r:id="rId19"/>
+    <p:sldId id="278" r:id="rId20"/>
+    <p:sldId id="272" r:id="rId21"/>
+    <p:sldId id="275" r:id="rId22"/>
   </p:sldIdLst>
   <p:sldSz cx="12192000" cy="6858000"/>
   <p:notesSz cx="6858000" cy="9144000"/>
@@ -115,7 +124,597 @@
       </a:defRPr>
     </a:lvl9pPr>
   </p:defaultTextStyle>
+  <p:extLst>
+    <p:ext uri="{EFAFB233-063F-42B5-8137-9DF3F51BA10A}">
+      <p15:sldGuideLst xmlns:p15="http://schemas.microsoft.com/office/powerpoint/2012/main"/>
+    </p:ext>
+  </p:extLst>
 </p:presentation>
+</file>
+
+<file path=ppt/revisionInfo.xml><?xml version="1.0" encoding="utf-8"?>
+<p1510:revInfo xmlns:a="http://schemas.openxmlformats.org/drawingml/2006/main" xmlns:r="http://schemas.openxmlformats.org/officeDocument/2006/relationships" xmlns:p1510="http://schemas.microsoft.com/office/powerpoint/2015/10/main">
+  <p1510:revLst>
+    <p1510:client id="{FBFF5B57-2EC9-41AA-8A62-579BA7454221}" v="117" dt="2023-01-22T08:28:42.698"/>
+  </p1510:revLst>
+</p1510:revInfo>
+</file>
+
+<file path=ppt/changesInfos/changesInfo1.xml><?xml version="1.0" encoding="utf-8"?>
+<pc:chgInfo xmlns:a="http://schemas.openxmlformats.org/drawingml/2006/main" xmlns:r="http://schemas.openxmlformats.org/officeDocument/2006/relationships" xmlns:ac="http://schemas.microsoft.com/office/drawing/2013/main/command" xmlns:pc="http://schemas.microsoft.com/office/powerpoint/2013/main/command">
+  <pc:docChgLst>
+    <pc:chgData name="Jharry" userId="81c1d075-99f2-4b54-a87d-66853751bd78" providerId="ADAL" clId="{FBFF5B57-2EC9-41AA-8A62-579BA7454221}"/>
+    <pc:docChg chg="undo redo custSel addSld delSld modSld">
+      <pc:chgData name="Jharry" userId="81c1d075-99f2-4b54-a87d-66853751bd78" providerId="ADAL" clId="{FBFF5B57-2EC9-41AA-8A62-579BA7454221}" dt="2023-01-22T08:28:50.976" v="531" actId="1076"/>
+      <pc:docMkLst>
+        <pc:docMk/>
+      </pc:docMkLst>
+      <pc:sldChg chg="addSp delSp modSp add mod delAnim">
+        <pc:chgData name="Jharry" userId="81c1d075-99f2-4b54-a87d-66853751bd78" providerId="ADAL" clId="{FBFF5B57-2EC9-41AA-8A62-579BA7454221}" dt="2023-01-22T07:58:42.040" v="33" actId="1076"/>
+        <pc:sldMkLst>
+          <pc:docMk/>
+          <pc:sldMk cId="2556340243" sldId="269"/>
+        </pc:sldMkLst>
+        <pc:spChg chg="add mod">
+          <ac:chgData name="Jharry" userId="81c1d075-99f2-4b54-a87d-66853751bd78" providerId="ADAL" clId="{FBFF5B57-2EC9-41AA-8A62-579BA7454221}" dt="2023-01-22T07:58:42.040" v="33" actId="1076"/>
+          <ac:spMkLst>
+            <pc:docMk/>
+            <pc:sldMk cId="2556340243" sldId="269"/>
+            <ac:spMk id="2" creationId="{278C3AE2-9179-F8F6-A05F-BA0FF896F3BA}"/>
+          </ac:spMkLst>
+        </pc:spChg>
+        <pc:spChg chg="del">
+          <ac:chgData name="Jharry" userId="81c1d075-99f2-4b54-a87d-66853751bd78" providerId="ADAL" clId="{FBFF5B57-2EC9-41AA-8A62-579BA7454221}" dt="2023-01-22T07:57:58.445" v="2" actId="478"/>
+          <ac:spMkLst>
+            <pc:docMk/>
+            <pc:sldMk cId="2556340243" sldId="269"/>
+            <ac:spMk id="5" creationId="{A1366CC3-1616-C8CF-7E8D-5B8064C607B4}"/>
+          </ac:spMkLst>
+        </pc:spChg>
+        <pc:picChg chg="del">
+          <ac:chgData name="Jharry" userId="81c1d075-99f2-4b54-a87d-66853751bd78" providerId="ADAL" clId="{FBFF5B57-2EC9-41AA-8A62-579BA7454221}" dt="2023-01-22T07:57:56.676" v="1" actId="478"/>
+          <ac:picMkLst>
+            <pc:docMk/>
+            <pc:sldMk cId="2556340243" sldId="269"/>
+            <ac:picMk id="4" creationId="{78221E10-0922-282E-5047-0E3C0565B07E}"/>
+          </ac:picMkLst>
+        </pc:picChg>
+      </pc:sldChg>
+      <pc:sldChg chg="modSp add mod">
+        <pc:chgData name="Jharry" userId="81c1d075-99f2-4b54-a87d-66853751bd78" providerId="ADAL" clId="{FBFF5B57-2EC9-41AA-8A62-579BA7454221}" dt="2023-01-22T07:59:07.332" v="50" actId="1076"/>
+        <pc:sldMkLst>
+          <pc:docMk/>
+          <pc:sldMk cId="3994603650" sldId="270"/>
+        </pc:sldMkLst>
+        <pc:spChg chg="mod">
+          <ac:chgData name="Jharry" userId="81c1d075-99f2-4b54-a87d-66853751bd78" providerId="ADAL" clId="{FBFF5B57-2EC9-41AA-8A62-579BA7454221}" dt="2023-01-22T07:59:07.332" v="50" actId="1076"/>
+          <ac:spMkLst>
+            <pc:docMk/>
+            <pc:sldMk cId="3994603650" sldId="270"/>
+            <ac:spMk id="2" creationId="{278C3AE2-9179-F8F6-A05F-BA0FF896F3BA}"/>
+          </ac:spMkLst>
+        </pc:spChg>
+      </pc:sldChg>
+      <pc:sldChg chg="addSp delSp modSp add mod">
+        <pc:chgData name="Jharry" userId="81c1d075-99f2-4b54-a87d-66853751bd78" providerId="ADAL" clId="{FBFF5B57-2EC9-41AA-8A62-579BA7454221}" dt="2023-01-22T08:26:21.026" v="510" actId="478"/>
+        <pc:sldMkLst>
+          <pc:docMk/>
+          <pc:sldMk cId="3076750160" sldId="271"/>
+        </pc:sldMkLst>
+        <pc:spChg chg="mod">
+          <ac:chgData name="Jharry" userId="81c1d075-99f2-4b54-a87d-66853751bd78" providerId="ADAL" clId="{FBFF5B57-2EC9-41AA-8A62-579BA7454221}" dt="2023-01-22T08:04:02.777" v="118"/>
+          <ac:spMkLst>
+            <pc:docMk/>
+            <pc:sldMk cId="3076750160" sldId="271"/>
+            <ac:spMk id="2" creationId="{278C3AE2-9179-F8F6-A05F-BA0FF896F3BA}"/>
+          </ac:spMkLst>
+        </pc:spChg>
+        <pc:picChg chg="add mod">
+          <ac:chgData name="Jharry" userId="81c1d075-99f2-4b54-a87d-66853751bd78" providerId="ADAL" clId="{FBFF5B57-2EC9-41AA-8A62-579BA7454221}" dt="2023-01-22T08:03:39.441" v="105" actId="14100"/>
+          <ac:picMkLst>
+            <pc:docMk/>
+            <pc:sldMk cId="3076750160" sldId="271"/>
+            <ac:picMk id="3" creationId="{F05659D1-E06C-C938-72A7-8BEA576D0F8F}"/>
+          </ac:picMkLst>
+        </pc:picChg>
+        <pc:picChg chg="add del mod">
+          <ac:chgData name="Jharry" userId="81c1d075-99f2-4b54-a87d-66853751bd78" providerId="ADAL" clId="{FBFF5B57-2EC9-41AA-8A62-579BA7454221}" dt="2023-01-22T08:26:21.026" v="510" actId="478"/>
+          <ac:picMkLst>
+            <pc:docMk/>
+            <pc:sldMk cId="3076750160" sldId="271"/>
+            <ac:picMk id="4" creationId="{B3DC6838-2DC3-5548-61DF-98F22A448700}"/>
+          </ac:picMkLst>
+        </pc:picChg>
+        <pc:picChg chg="add del">
+          <ac:chgData name="Jharry" userId="81c1d075-99f2-4b54-a87d-66853751bd78" providerId="ADAL" clId="{FBFF5B57-2EC9-41AA-8A62-579BA7454221}" dt="2023-01-22T08:26:02.396" v="500"/>
+          <ac:picMkLst>
+            <pc:docMk/>
+            <pc:sldMk cId="3076750160" sldId="271"/>
+            <ac:picMk id="5" creationId="{F0879D38-62BB-8373-E576-6593B405F3DB}"/>
+          </ac:picMkLst>
+        </pc:picChg>
+      </pc:sldChg>
+      <pc:sldChg chg="addSp delSp modSp add del mod">
+        <pc:chgData name="Jharry" userId="81c1d075-99f2-4b54-a87d-66853751bd78" providerId="ADAL" clId="{FBFF5B57-2EC9-41AA-8A62-579BA7454221}" dt="2023-01-22T08:21:11.193" v="445" actId="47"/>
+        <pc:sldMkLst>
+          <pc:docMk/>
+          <pc:sldMk cId="2970960876" sldId="272"/>
+        </pc:sldMkLst>
+        <pc:spChg chg="mod">
+          <ac:chgData name="Jharry" userId="81c1d075-99f2-4b54-a87d-66853751bd78" providerId="ADAL" clId="{FBFF5B57-2EC9-41AA-8A62-579BA7454221}" dt="2023-01-22T08:14:26.867" v="260" actId="20577"/>
+          <ac:spMkLst>
+            <pc:docMk/>
+            <pc:sldMk cId="2970960876" sldId="272"/>
+            <ac:spMk id="2" creationId="{278C3AE2-9179-F8F6-A05F-BA0FF896F3BA}"/>
+          </ac:spMkLst>
+        </pc:spChg>
+        <pc:spChg chg="add del mod">
+          <ac:chgData name="Jharry" userId="81c1d075-99f2-4b54-a87d-66853751bd78" providerId="ADAL" clId="{FBFF5B57-2EC9-41AA-8A62-579BA7454221}" dt="2023-01-22T08:08:15.470" v="182" actId="478"/>
+          <ac:spMkLst>
+            <pc:docMk/>
+            <pc:sldMk cId="2970960876" sldId="272"/>
+            <ac:spMk id="9" creationId="{248B16FD-B8C4-51C6-C9D9-5AB26E277F63}"/>
+          </ac:spMkLst>
+        </pc:spChg>
+        <pc:spChg chg="add del mod">
+          <ac:chgData name="Jharry" userId="81c1d075-99f2-4b54-a87d-66853751bd78" providerId="ADAL" clId="{FBFF5B57-2EC9-41AA-8A62-579BA7454221}" dt="2023-01-22T08:14:27.652" v="262"/>
+          <ac:spMkLst>
+            <pc:docMk/>
+            <pc:sldMk cId="2970960876" sldId="272"/>
+            <ac:spMk id="15" creationId="{BC932C05-6EC7-E070-1994-B3DDCBCD896D}"/>
+          </ac:spMkLst>
+        </pc:spChg>
+        <pc:picChg chg="del">
+          <ac:chgData name="Jharry" userId="81c1d075-99f2-4b54-a87d-66853751bd78" providerId="ADAL" clId="{FBFF5B57-2EC9-41AA-8A62-579BA7454221}" dt="2023-01-22T08:04:20.695" v="128" actId="478"/>
+          <ac:picMkLst>
+            <pc:docMk/>
+            <pc:sldMk cId="2970960876" sldId="272"/>
+            <ac:picMk id="3" creationId="{F05659D1-E06C-C938-72A7-8BEA576D0F8F}"/>
+          </ac:picMkLst>
+        </pc:picChg>
+        <pc:picChg chg="add del mod">
+          <ac:chgData name="Jharry" userId="81c1d075-99f2-4b54-a87d-66853751bd78" providerId="ADAL" clId="{FBFF5B57-2EC9-41AA-8A62-579BA7454221}" dt="2023-01-22T08:08:46.570" v="184" actId="478"/>
+          <ac:picMkLst>
+            <pc:docMk/>
+            <pc:sldMk cId="2970960876" sldId="272"/>
+            <ac:picMk id="4" creationId="{60E6DE0B-406E-BD0E-9538-80C83DE496E5}"/>
+          </ac:picMkLst>
+        </pc:picChg>
+        <pc:picChg chg="add del mod">
+          <ac:chgData name="Jharry" userId="81c1d075-99f2-4b54-a87d-66853751bd78" providerId="ADAL" clId="{FBFF5B57-2EC9-41AA-8A62-579BA7454221}" dt="2023-01-22T08:08:13.848" v="181" actId="478"/>
+          <ac:picMkLst>
+            <pc:docMk/>
+            <pc:sldMk cId="2970960876" sldId="272"/>
+            <ac:picMk id="5" creationId="{B6584CBB-54E5-8344-9FD3-22DB9A57C049}"/>
+          </ac:picMkLst>
+        </pc:picChg>
+        <pc:picChg chg="add del mod">
+          <ac:chgData name="Jharry" userId="81c1d075-99f2-4b54-a87d-66853751bd78" providerId="ADAL" clId="{FBFF5B57-2EC9-41AA-8A62-579BA7454221}" dt="2023-01-22T08:11:24.587" v="190" actId="478"/>
+          <ac:picMkLst>
+            <pc:docMk/>
+            <pc:sldMk cId="2970960876" sldId="272"/>
+            <ac:picMk id="11" creationId="{C73468A3-21DE-6967-CA27-31BA75BF7DAC}"/>
+          </ac:picMkLst>
+        </pc:picChg>
+        <pc:picChg chg="add del mod">
+          <ac:chgData name="Jharry" userId="81c1d075-99f2-4b54-a87d-66853751bd78" providerId="ADAL" clId="{FBFF5B57-2EC9-41AA-8A62-579BA7454221}" dt="2023-01-22T08:12:34.054" v="211" actId="478"/>
+          <ac:picMkLst>
+            <pc:docMk/>
+            <pc:sldMk cId="2970960876" sldId="272"/>
+            <ac:picMk id="12" creationId="{5024086D-A400-5431-B26B-2B0DB5038A88}"/>
+          </ac:picMkLst>
+        </pc:picChg>
+        <pc:picChg chg="add del mod">
+          <ac:chgData name="Jharry" userId="81c1d075-99f2-4b54-a87d-66853751bd78" providerId="ADAL" clId="{FBFF5B57-2EC9-41AA-8A62-579BA7454221}" dt="2023-01-22T08:12:21.720" v="205" actId="478"/>
+          <ac:picMkLst>
+            <pc:docMk/>
+            <pc:sldMk cId="2970960876" sldId="272"/>
+            <ac:picMk id="13" creationId="{13F192DF-966F-466D-F264-8FCF255E1CC7}"/>
+          </ac:picMkLst>
+        </pc:picChg>
+        <pc:picChg chg="add mod">
+          <ac:chgData name="Jharry" userId="81c1d075-99f2-4b54-a87d-66853751bd78" providerId="ADAL" clId="{FBFF5B57-2EC9-41AA-8A62-579BA7454221}" dt="2023-01-22T08:12:35.216" v="212" actId="1076"/>
+          <ac:picMkLst>
+            <pc:docMk/>
+            <pc:sldMk cId="2970960876" sldId="272"/>
+            <ac:picMk id="14" creationId="{C1DB1CEB-EBBE-3654-B6F0-41CB09690BC5}"/>
+          </ac:picMkLst>
+        </pc:picChg>
+        <pc:cxnChg chg="add del mod">
+          <ac:chgData name="Jharry" userId="81c1d075-99f2-4b54-a87d-66853751bd78" providerId="ADAL" clId="{FBFF5B57-2EC9-41AA-8A62-579BA7454221}" dt="2023-01-22T08:08:16.080" v="183" actId="478"/>
+          <ac:cxnSpMkLst>
+            <pc:docMk/>
+            <pc:sldMk cId="2970960876" sldId="272"/>
+            <ac:cxnSpMk id="7" creationId="{B0982BE6-7E2C-6FCC-552C-4914C7612D68}"/>
+          </ac:cxnSpMkLst>
+        </pc:cxnChg>
+      </pc:sldChg>
+      <pc:sldChg chg="addSp delSp modSp add del mod">
+        <pc:chgData name="Jharry" userId="81c1d075-99f2-4b54-a87d-66853751bd78" providerId="ADAL" clId="{FBFF5B57-2EC9-41AA-8A62-579BA7454221}" dt="2023-01-22T08:12:31.080" v="209" actId="47"/>
+        <pc:sldMkLst>
+          <pc:docMk/>
+          <pc:sldMk cId="926200243" sldId="273"/>
+        </pc:sldMkLst>
+        <pc:spChg chg="add mod">
+          <ac:chgData name="Jharry" userId="81c1d075-99f2-4b54-a87d-66853751bd78" providerId="ADAL" clId="{FBFF5B57-2EC9-41AA-8A62-579BA7454221}" dt="2023-01-22T08:07:16.391" v="164"/>
+          <ac:spMkLst>
+            <pc:docMk/>
+            <pc:sldMk cId="926200243" sldId="273"/>
+            <ac:spMk id="7" creationId="{80248C6C-C5F1-A6C4-DF57-6A10D0AE6777}"/>
+          </ac:spMkLst>
+        </pc:spChg>
+        <pc:picChg chg="add mod">
+          <ac:chgData name="Jharry" userId="81c1d075-99f2-4b54-a87d-66853751bd78" providerId="ADAL" clId="{FBFF5B57-2EC9-41AA-8A62-579BA7454221}" dt="2023-01-22T08:07:21.516" v="166" actId="1076"/>
+          <ac:picMkLst>
+            <pc:docMk/>
+            <pc:sldMk cId="926200243" sldId="273"/>
+            <ac:picMk id="3" creationId="{CC339DCB-1DD2-F1D0-45B1-7A0033427932}"/>
+          </ac:picMkLst>
+        </pc:picChg>
+        <pc:picChg chg="del mod">
+          <ac:chgData name="Jharry" userId="81c1d075-99f2-4b54-a87d-66853751bd78" providerId="ADAL" clId="{FBFF5B57-2EC9-41AA-8A62-579BA7454221}" dt="2023-01-22T08:07:30.601" v="167" actId="478"/>
+          <ac:picMkLst>
+            <pc:docMk/>
+            <pc:sldMk cId="926200243" sldId="273"/>
+            <ac:picMk id="4" creationId="{60E6DE0B-406E-BD0E-9538-80C83DE496E5}"/>
+          </ac:picMkLst>
+        </pc:picChg>
+        <pc:picChg chg="del">
+          <ac:chgData name="Jharry" userId="81c1d075-99f2-4b54-a87d-66853751bd78" providerId="ADAL" clId="{FBFF5B57-2EC9-41AA-8A62-579BA7454221}" dt="2023-01-22T08:05:32.157" v="137" actId="478"/>
+          <ac:picMkLst>
+            <pc:docMk/>
+            <pc:sldMk cId="926200243" sldId="273"/>
+            <ac:picMk id="5" creationId="{B6584CBB-54E5-8344-9FD3-22DB9A57C049}"/>
+          </ac:picMkLst>
+        </pc:picChg>
+        <pc:picChg chg="add mod">
+          <ac:chgData name="Jharry" userId="81c1d075-99f2-4b54-a87d-66853751bd78" providerId="ADAL" clId="{FBFF5B57-2EC9-41AA-8A62-579BA7454221}" dt="2023-01-22T08:07:31.016" v="168"/>
+          <ac:picMkLst>
+            <pc:docMk/>
+            <pc:sldMk cId="926200243" sldId="273"/>
+            <ac:picMk id="8" creationId="{B55D0653-5C7A-D208-EAE7-F7EA69295EF6}"/>
+          </ac:picMkLst>
+        </pc:picChg>
+        <pc:cxnChg chg="add mod">
+          <ac:chgData name="Jharry" userId="81c1d075-99f2-4b54-a87d-66853751bd78" providerId="ADAL" clId="{FBFF5B57-2EC9-41AA-8A62-579BA7454221}" dt="2023-01-22T08:07:16.391" v="164"/>
+          <ac:cxnSpMkLst>
+            <pc:docMk/>
+            <pc:sldMk cId="926200243" sldId="273"/>
+            <ac:cxnSpMk id="6" creationId="{39AF5EB6-2EC5-02BF-91AD-397E1016CD2F}"/>
+          </ac:cxnSpMkLst>
+        </pc:cxnChg>
+      </pc:sldChg>
+      <pc:sldChg chg="add del">
+        <pc:chgData name="Jharry" userId="81c1d075-99f2-4b54-a87d-66853751bd78" providerId="ADAL" clId="{FBFF5B57-2EC9-41AA-8A62-579BA7454221}" dt="2023-01-22T08:12:31.851" v="210" actId="47"/>
+        <pc:sldMkLst>
+          <pc:docMk/>
+          <pc:sldMk cId="71610729" sldId="274"/>
+        </pc:sldMkLst>
+      </pc:sldChg>
+      <pc:sldChg chg="addSp delSp modSp add mod">
+        <pc:chgData name="Jharry" userId="81c1d075-99f2-4b54-a87d-66853751bd78" providerId="ADAL" clId="{FBFF5B57-2EC9-41AA-8A62-579BA7454221}" dt="2023-01-22T08:20:20.833" v="440" actId="1076"/>
+        <pc:sldMkLst>
+          <pc:docMk/>
+          <pc:sldMk cId="3677675599" sldId="275"/>
+        </pc:sldMkLst>
+        <pc:spChg chg="mod">
+          <ac:chgData name="Jharry" userId="81c1d075-99f2-4b54-a87d-66853751bd78" providerId="ADAL" clId="{FBFF5B57-2EC9-41AA-8A62-579BA7454221}" dt="2023-01-22T08:16:29.727" v="327" actId="1076"/>
+          <ac:spMkLst>
+            <pc:docMk/>
+            <pc:sldMk cId="3677675599" sldId="275"/>
+            <ac:spMk id="2" creationId="{278C3AE2-9179-F8F6-A05F-BA0FF896F3BA}"/>
+          </ac:spMkLst>
+        </pc:spChg>
+        <pc:spChg chg="add del mod">
+          <ac:chgData name="Jharry" userId="81c1d075-99f2-4b54-a87d-66853751bd78" providerId="ADAL" clId="{FBFF5B57-2EC9-41AA-8A62-579BA7454221}" dt="2023-01-22T08:14:18.364" v="252" actId="478"/>
+          <ac:spMkLst>
+            <pc:docMk/>
+            <pc:sldMk cId="3677675599" sldId="275"/>
+            <ac:spMk id="3" creationId="{25C69785-69F4-3953-36C3-2038C2CEF2D4}"/>
+          </ac:spMkLst>
+        </pc:spChg>
+        <pc:spChg chg="add del mod">
+          <ac:chgData name="Jharry" userId="81c1d075-99f2-4b54-a87d-66853751bd78" providerId="ADAL" clId="{FBFF5B57-2EC9-41AA-8A62-579BA7454221}" dt="2023-01-22T08:14:33.822" v="271"/>
+          <ac:spMkLst>
+            <pc:docMk/>
+            <pc:sldMk cId="3677675599" sldId="275"/>
+            <ac:spMk id="5" creationId="{946DA831-F089-2343-C659-EA1D4C021295}"/>
+          </ac:spMkLst>
+        </pc:spChg>
+        <pc:spChg chg="add mod">
+          <ac:chgData name="Jharry" userId="81c1d075-99f2-4b54-a87d-66853751bd78" providerId="ADAL" clId="{FBFF5B57-2EC9-41AA-8A62-579BA7454221}" dt="2023-01-22T08:19:35.975" v="414" actId="1076"/>
+          <ac:spMkLst>
+            <pc:docMk/>
+            <pc:sldMk cId="3677675599" sldId="275"/>
+            <ac:spMk id="7" creationId="{8BDE87AD-4023-B6BF-EA12-6F803365129D}"/>
+          </ac:spMkLst>
+        </pc:spChg>
+        <pc:spChg chg="add mod">
+          <ac:chgData name="Jharry" userId="81c1d075-99f2-4b54-a87d-66853751bd78" providerId="ADAL" clId="{FBFF5B57-2EC9-41AA-8A62-579BA7454221}" dt="2023-01-22T08:20:15.132" v="436" actId="1076"/>
+          <ac:spMkLst>
+            <pc:docMk/>
+            <pc:sldMk cId="3677675599" sldId="275"/>
+            <ac:spMk id="8" creationId="{6B35D1E2-CB30-1899-1601-2F7551B9D25C}"/>
+          </ac:spMkLst>
+        </pc:spChg>
+        <pc:spChg chg="add mod">
+          <ac:chgData name="Jharry" userId="81c1d075-99f2-4b54-a87d-66853751bd78" providerId="ADAL" clId="{FBFF5B57-2EC9-41AA-8A62-579BA7454221}" dt="2023-01-22T08:20:20.833" v="440" actId="1076"/>
+          <ac:spMkLst>
+            <pc:docMk/>
+            <pc:sldMk cId="3677675599" sldId="275"/>
+            <ac:spMk id="9" creationId="{C860BA6A-8E2F-9A27-907B-B59D30C7B972}"/>
+          </ac:spMkLst>
+        </pc:spChg>
+        <pc:picChg chg="add mod modCrop">
+          <ac:chgData name="Jharry" userId="81c1d075-99f2-4b54-a87d-66853751bd78" providerId="ADAL" clId="{FBFF5B57-2EC9-41AA-8A62-579BA7454221}" dt="2023-01-22T08:20:19.177" v="439" actId="1076"/>
+          <ac:picMkLst>
+            <pc:docMk/>
+            <pc:sldMk cId="3677675599" sldId="275"/>
+            <ac:picMk id="4" creationId="{BA78D890-B9FE-2868-5AF3-3EAB97801CAC}"/>
+          </ac:picMkLst>
+        </pc:picChg>
+        <pc:picChg chg="add del mod ord">
+          <ac:chgData name="Jharry" userId="81c1d075-99f2-4b54-a87d-66853751bd78" providerId="ADAL" clId="{FBFF5B57-2EC9-41AA-8A62-579BA7454221}" dt="2023-01-22T08:20:12.160" v="434" actId="1076"/>
+          <ac:picMkLst>
+            <pc:docMk/>
+            <pc:sldMk cId="3677675599" sldId="275"/>
+            <ac:picMk id="10" creationId="{3D46E0F1-B111-3343-0D40-7CF05F6A33CC}"/>
+          </ac:picMkLst>
+        </pc:picChg>
+        <pc:picChg chg="add mod">
+          <ac:chgData name="Jharry" userId="81c1d075-99f2-4b54-a87d-66853751bd78" providerId="ADAL" clId="{FBFF5B57-2EC9-41AA-8A62-579BA7454221}" dt="2023-01-22T08:20:17.743" v="438" actId="1076"/>
+          <ac:picMkLst>
+            <pc:docMk/>
+            <pc:sldMk cId="3677675599" sldId="275"/>
+            <ac:picMk id="11" creationId="{9FD1341A-6433-D6BA-767D-CBFA40D33C7B}"/>
+          </ac:picMkLst>
+        </pc:picChg>
+        <pc:picChg chg="add del mod">
+          <ac:chgData name="Jharry" userId="81c1d075-99f2-4b54-a87d-66853751bd78" providerId="ADAL" clId="{FBFF5B57-2EC9-41AA-8A62-579BA7454221}" dt="2023-01-22T08:18:11.808" v="376" actId="478"/>
+          <ac:picMkLst>
+            <pc:docMk/>
+            <pc:sldMk cId="3677675599" sldId="275"/>
+            <ac:picMk id="12" creationId="{5024086D-A400-5431-B26B-2B0DB5038A88}"/>
+          </ac:picMkLst>
+        </pc:picChg>
+        <pc:picChg chg="add mod">
+          <ac:chgData name="Jharry" userId="81c1d075-99f2-4b54-a87d-66853751bd78" providerId="ADAL" clId="{FBFF5B57-2EC9-41AA-8A62-579BA7454221}" dt="2023-01-22T08:20:07.304" v="431" actId="1076"/>
+          <ac:picMkLst>
+            <pc:docMk/>
+            <pc:sldMk cId="3677675599" sldId="275"/>
+            <ac:picMk id="13" creationId="{408A6B05-EDB3-90F5-394E-C4F8A4332F04}"/>
+          </ac:picMkLst>
+        </pc:picChg>
+        <pc:picChg chg="del">
+          <ac:chgData name="Jharry" userId="81c1d075-99f2-4b54-a87d-66853751bd78" providerId="ADAL" clId="{FBFF5B57-2EC9-41AA-8A62-579BA7454221}" dt="2023-01-22T08:12:59.365" v="227" actId="478"/>
+          <ac:picMkLst>
+            <pc:docMk/>
+            <pc:sldMk cId="3677675599" sldId="275"/>
+            <ac:picMk id="14" creationId="{C1DB1CEB-EBBE-3654-B6F0-41CB09690BC5}"/>
+          </ac:picMkLst>
+        </pc:picChg>
+      </pc:sldChg>
+      <pc:sldChg chg="addSp delSp modSp add mod">
+        <pc:chgData name="Jharry" userId="81c1d075-99f2-4b54-a87d-66853751bd78" providerId="ADAL" clId="{FBFF5B57-2EC9-41AA-8A62-579BA7454221}" dt="2023-01-22T08:21:50.694" v="462" actId="1076"/>
+        <pc:sldMkLst>
+          <pc:docMk/>
+          <pc:sldMk cId="3126281903" sldId="276"/>
+        </pc:sldMkLst>
+        <pc:spChg chg="mod">
+          <ac:chgData name="Jharry" userId="81c1d075-99f2-4b54-a87d-66853751bd78" providerId="ADAL" clId="{FBFF5B57-2EC9-41AA-8A62-579BA7454221}" dt="2023-01-22T08:21:22.381" v="452"/>
+          <ac:spMkLst>
+            <pc:docMk/>
+            <pc:sldMk cId="3126281903" sldId="276"/>
+            <ac:spMk id="2" creationId="{278C3AE2-9179-F8F6-A05F-BA0FF896F3BA}"/>
+          </ac:spMkLst>
+        </pc:spChg>
+        <pc:picChg chg="del mod">
+          <ac:chgData name="Jharry" userId="81c1d075-99f2-4b54-a87d-66853751bd78" providerId="ADAL" clId="{FBFF5B57-2EC9-41AA-8A62-579BA7454221}" dt="2023-01-22T08:21:23.653" v="454" actId="478"/>
+          <ac:picMkLst>
+            <pc:docMk/>
+            <pc:sldMk cId="3126281903" sldId="276"/>
+            <ac:picMk id="3" creationId="{F05659D1-E06C-C938-72A7-8BEA576D0F8F}"/>
+          </ac:picMkLst>
+        </pc:picChg>
+        <pc:picChg chg="add mod">
+          <ac:chgData name="Jharry" userId="81c1d075-99f2-4b54-a87d-66853751bd78" providerId="ADAL" clId="{FBFF5B57-2EC9-41AA-8A62-579BA7454221}" dt="2023-01-22T08:21:45.677" v="460" actId="1076"/>
+          <ac:picMkLst>
+            <pc:docMk/>
+            <pc:sldMk cId="3126281903" sldId="276"/>
+            <ac:picMk id="4" creationId="{5F409424-E2EA-C118-664D-156E9582A860}"/>
+          </ac:picMkLst>
+        </pc:picChg>
+        <pc:picChg chg="add mod">
+          <ac:chgData name="Jharry" userId="81c1d075-99f2-4b54-a87d-66853751bd78" providerId="ADAL" clId="{FBFF5B57-2EC9-41AA-8A62-579BA7454221}" dt="2023-01-22T08:21:48.527" v="461" actId="1076"/>
+          <ac:picMkLst>
+            <pc:docMk/>
+            <pc:sldMk cId="3126281903" sldId="276"/>
+            <ac:picMk id="5" creationId="{40927F9E-9AE7-6817-BC99-6B0FAA6F179A}"/>
+          </ac:picMkLst>
+        </pc:picChg>
+        <pc:picChg chg="add mod">
+          <ac:chgData name="Jharry" userId="81c1d075-99f2-4b54-a87d-66853751bd78" providerId="ADAL" clId="{FBFF5B57-2EC9-41AA-8A62-579BA7454221}" dt="2023-01-22T08:21:50.694" v="462" actId="1076"/>
+          <ac:picMkLst>
+            <pc:docMk/>
+            <pc:sldMk cId="3126281903" sldId="276"/>
+            <ac:picMk id="6" creationId="{F04E4393-FA8B-4FB0-C179-B30DB2A2838E}"/>
+          </ac:picMkLst>
+        </pc:picChg>
+      </pc:sldChg>
+      <pc:sldChg chg="modSp add del mod">
+        <pc:chgData name="Jharry" userId="81c1d075-99f2-4b54-a87d-66853751bd78" providerId="ADAL" clId="{FBFF5B57-2EC9-41AA-8A62-579BA7454221}" dt="2023-01-22T08:21:09.119" v="443" actId="47"/>
+        <pc:sldMkLst>
+          <pc:docMk/>
+          <pc:sldMk cId="3491646549" sldId="276"/>
+        </pc:sldMkLst>
+        <pc:spChg chg="mod">
+          <ac:chgData name="Jharry" userId="81c1d075-99f2-4b54-a87d-66853751bd78" providerId="ADAL" clId="{FBFF5B57-2EC9-41AA-8A62-579BA7454221}" dt="2023-01-22T08:20:59.338" v="442" actId="20577"/>
+          <ac:spMkLst>
+            <pc:docMk/>
+            <pc:sldMk cId="3491646549" sldId="276"/>
+            <ac:spMk id="2" creationId="{278C3AE2-9179-F8F6-A05F-BA0FF896F3BA}"/>
+          </ac:spMkLst>
+        </pc:spChg>
+      </pc:sldChg>
+      <pc:sldChg chg="addSp delSp modSp add mod">
+        <pc:chgData name="Jharry" userId="81c1d075-99f2-4b54-a87d-66853751bd78" providerId="ADAL" clId="{FBFF5B57-2EC9-41AA-8A62-579BA7454221}" dt="2023-01-22T08:27:36.533" v="524" actId="1076"/>
+        <pc:sldMkLst>
+          <pc:docMk/>
+          <pc:sldMk cId="2197385518" sldId="277"/>
+        </pc:sldMkLst>
+        <pc:picChg chg="add mod modCrop">
+          <ac:chgData name="Jharry" userId="81c1d075-99f2-4b54-a87d-66853751bd78" providerId="ADAL" clId="{FBFF5B57-2EC9-41AA-8A62-579BA7454221}" dt="2023-01-22T08:27:35.554" v="523" actId="1076"/>
+          <ac:picMkLst>
+            <pc:docMk/>
+            <pc:sldMk cId="2197385518" sldId="277"/>
+            <ac:picMk id="3" creationId="{FB943B32-F53D-A5D5-6914-67CDF551AD66}"/>
+          </ac:picMkLst>
+        </pc:picChg>
+        <pc:picChg chg="mod">
+          <ac:chgData name="Jharry" userId="81c1d075-99f2-4b54-a87d-66853751bd78" providerId="ADAL" clId="{FBFF5B57-2EC9-41AA-8A62-579BA7454221}" dt="2023-01-22T08:27:33.609" v="522" actId="1076"/>
+          <ac:picMkLst>
+            <pc:docMk/>
+            <pc:sldMk cId="2197385518" sldId="277"/>
+            <ac:picMk id="4" creationId="{5F409424-E2EA-C118-664D-156E9582A860}"/>
+          </ac:picMkLst>
+        </pc:picChg>
+        <pc:picChg chg="mod">
+          <ac:chgData name="Jharry" userId="81c1d075-99f2-4b54-a87d-66853751bd78" providerId="ADAL" clId="{FBFF5B57-2EC9-41AA-8A62-579BA7454221}" dt="2023-01-22T08:27:27.044" v="517" actId="1076"/>
+          <ac:picMkLst>
+            <pc:docMk/>
+            <pc:sldMk cId="2197385518" sldId="277"/>
+            <ac:picMk id="5" creationId="{40927F9E-9AE7-6817-BC99-6B0FAA6F179A}"/>
+          </ac:picMkLst>
+        </pc:picChg>
+        <pc:picChg chg="del">
+          <ac:chgData name="Jharry" userId="81c1d075-99f2-4b54-a87d-66853751bd78" providerId="ADAL" clId="{FBFF5B57-2EC9-41AA-8A62-579BA7454221}" dt="2023-01-22T08:21:56.151" v="464" actId="478"/>
+          <ac:picMkLst>
+            <pc:docMk/>
+            <pc:sldMk cId="2197385518" sldId="277"/>
+            <ac:picMk id="6" creationId="{F04E4393-FA8B-4FB0-C179-B30DB2A2838E}"/>
+          </ac:picMkLst>
+        </pc:picChg>
+        <pc:picChg chg="add mod">
+          <ac:chgData name="Jharry" userId="81c1d075-99f2-4b54-a87d-66853751bd78" providerId="ADAL" clId="{FBFF5B57-2EC9-41AA-8A62-579BA7454221}" dt="2023-01-22T08:27:36.533" v="524" actId="1076"/>
+          <ac:picMkLst>
+            <pc:docMk/>
+            <pc:sldMk cId="2197385518" sldId="277"/>
+            <ac:picMk id="7" creationId="{A278E51E-7DDD-26FA-AC6D-6BA700E8763C}"/>
+          </ac:picMkLst>
+        </pc:picChg>
+      </pc:sldChg>
+      <pc:sldChg chg="addSp delSp modSp add mod">
+        <pc:chgData name="Jharry" userId="81c1d075-99f2-4b54-a87d-66853751bd78" providerId="ADAL" clId="{FBFF5B57-2EC9-41AA-8A62-579BA7454221}" dt="2023-01-22T08:28:50.976" v="531" actId="1076"/>
+        <pc:sldMkLst>
+          <pc:docMk/>
+          <pc:sldMk cId="527029476" sldId="278"/>
+        </pc:sldMkLst>
+        <pc:spChg chg="mod">
+          <ac:chgData name="Jharry" userId="81c1d075-99f2-4b54-a87d-66853751bd78" providerId="ADAL" clId="{FBFF5B57-2EC9-41AA-8A62-579BA7454221}" dt="2023-01-22T08:22:31.478" v="478"/>
+          <ac:spMkLst>
+            <pc:docMk/>
+            <pc:sldMk cId="527029476" sldId="278"/>
+            <ac:spMk id="2" creationId="{278C3AE2-9179-F8F6-A05F-BA0FF896F3BA}"/>
+          </ac:spMkLst>
+        </pc:spChg>
+        <pc:picChg chg="add mod">
+          <ac:chgData name="Jharry" userId="81c1d075-99f2-4b54-a87d-66853751bd78" providerId="ADAL" clId="{FBFF5B57-2EC9-41AA-8A62-579BA7454221}" dt="2023-01-22T08:28:49.947" v="530" actId="1076"/>
+          <ac:picMkLst>
+            <pc:docMk/>
+            <pc:sldMk cId="527029476" sldId="278"/>
+            <ac:picMk id="3" creationId="{F45ED90A-A683-100E-C487-ED697AF5E117}"/>
+          </ac:picMkLst>
+        </pc:picChg>
+        <pc:picChg chg="del">
+          <ac:chgData name="Jharry" userId="81c1d075-99f2-4b54-a87d-66853751bd78" providerId="ADAL" clId="{FBFF5B57-2EC9-41AA-8A62-579BA7454221}" dt="2023-01-22T08:22:38.751" v="480" actId="478"/>
+          <ac:picMkLst>
+            <pc:docMk/>
+            <pc:sldMk cId="527029476" sldId="278"/>
+            <ac:picMk id="4" creationId="{5F409424-E2EA-C118-664D-156E9582A860}"/>
+          </ac:picMkLst>
+        </pc:picChg>
+        <pc:picChg chg="del mod ord">
+          <ac:chgData name="Jharry" userId="81c1d075-99f2-4b54-a87d-66853751bd78" providerId="ADAL" clId="{FBFF5B57-2EC9-41AA-8A62-579BA7454221}" dt="2023-01-22T08:23:38.476" v="488" actId="478"/>
+          <ac:picMkLst>
+            <pc:docMk/>
+            <pc:sldMk cId="527029476" sldId="278"/>
+            <ac:picMk id="5" creationId="{40927F9E-9AE7-6817-BC99-6B0FAA6F179A}"/>
+          </ac:picMkLst>
+        </pc:picChg>
+        <pc:picChg chg="del">
+          <ac:chgData name="Jharry" userId="81c1d075-99f2-4b54-a87d-66853751bd78" providerId="ADAL" clId="{FBFF5B57-2EC9-41AA-8A62-579BA7454221}" dt="2023-01-22T08:22:39.259" v="481" actId="478"/>
+          <ac:picMkLst>
+            <pc:docMk/>
+            <pc:sldMk cId="527029476" sldId="278"/>
+            <ac:picMk id="6" creationId="{F04E4393-FA8B-4FB0-C179-B30DB2A2838E}"/>
+          </ac:picMkLst>
+        </pc:picChg>
+        <pc:picChg chg="add mod">
+          <ac:chgData name="Jharry" userId="81c1d075-99f2-4b54-a87d-66853751bd78" providerId="ADAL" clId="{FBFF5B57-2EC9-41AA-8A62-579BA7454221}" dt="2023-01-22T08:23:43.222" v="490" actId="1076"/>
+          <ac:picMkLst>
+            <pc:docMk/>
+            <pc:sldMk cId="527029476" sldId="278"/>
+            <ac:picMk id="7" creationId="{110EBEAE-0047-3504-6E04-1E0EAC383744}"/>
+          </ac:picMkLst>
+        </pc:picChg>
+        <pc:picChg chg="add mod modCrop">
+          <ac:chgData name="Jharry" userId="81c1d075-99f2-4b54-a87d-66853751bd78" providerId="ADAL" clId="{FBFF5B57-2EC9-41AA-8A62-579BA7454221}" dt="2023-01-22T08:24:10.394" v="495" actId="1076"/>
+          <ac:picMkLst>
+            <pc:docMk/>
+            <pc:sldMk cId="527029476" sldId="278"/>
+            <ac:picMk id="10" creationId="{2FDBB301-2077-06B0-86FE-EDB2A5422C12}"/>
+          </ac:picMkLst>
+        </pc:picChg>
+        <pc:picChg chg="add mod">
+          <ac:chgData name="Jharry" userId="81c1d075-99f2-4b54-a87d-66853751bd78" providerId="ADAL" clId="{FBFF5B57-2EC9-41AA-8A62-579BA7454221}" dt="2023-01-22T08:28:50.976" v="531" actId="1076"/>
+          <ac:picMkLst>
+            <pc:docMk/>
+            <pc:sldMk cId="527029476" sldId="278"/>
+            <ac:picMk id="11" creationId="{AC3DB554-A527-5455-4D5C-0E8FB3E0AC62}"/>
+          </ac:picMkLst>
+        </pc:picChg>
+        <pc:cxnChg chg="add mod">
+          <ac:chgData name="Jharry" userId="81c1d075-99f2-4b54-a87d-66853751bd78" providerId="ADAL" clId="{FBFF5B57-2EC9-41AA-8A62-579BA7454221}" dt="2023-01-22T08:23:53.822" v="492" actId="1582"/>
+          <ac:cxnSpMkLst>
+            <pc:docMk/>
+            <pc:sldMk cId="527029476" sldId="278"/>
+            <ac:cxnSpMk id="9" creationId="{3517B1B3-1B18-D8CE-B544-59C07DD61C5D}"/>
+          </ac:cxnSpMkLst>
+        </pc:cxnChg>
+      </pc:sldChg>
+      <pc:sldChg chg="add del">
+        <pc:chgData name="Jharry" userId="81c1d075-99f2-4b54-a87d-66853751bd78" providerId="ADAL" clId="{FBFF5B57-2EC9-41AA-8A62-579BA7454221}" dt="2023-01-22T08:26:05.693" v="502" actId="47"/>
+        <pc:sldMkLst>
+          <pc:docMk/>
+          <pc:sldMk cId="3108370188" sldId="279"/>
+        </pc:sldMkLst>
+      </pc:sldChg>
+      <pc:sldChg chg="delSp modSp add mod">
+        <pc:chgData name="Jharry" userId="81c1d075-99f2-4b54-a87d-66853751bd78" providerId="ADAL" clId="{FBFF5B57-2EC9-41AA-8A62-579BA7454221}" dt="2023-01-22T08:26:18.349" v="509" actId="1076"/>
+        <pc:sldMkLst>
+          <pc:docMk/>
+          <pc:sldMk cId="946948079" sldId="280"/>
+        </pc:sldMkLst>
+        <pc:picChg chg="del">
+          <ac:chgData name="Jharry" userId="81c1d075-99f2-4b54-a87d-66853751bd78" providerId="ADAL" clId="{FBFF5B57-2EC9-41AA-8A62-579BA7454221}" dt="2023-01-22T08:26:10.517" v="503" actId="478"/>
+          <ac:picMkLst>
+            <pc:docMk/>
+            <pc:sldMk cId="946948079" sldId="280"/>
+            <ac:picMk id="3" creationId="{F05659D1-E06C-C938-72A7-8BEA576D0F8F}"/>
+          </ac:picMkLst>
+        </pc:picChg>
+        <pc:picChg chg="mod">
+          <ac:chgData name="Jharry" userId="81c1d075-99f2-4b54-a87d-66853751bd78" providerId="ADAL" clId="{FBFF5B57-2EC9-41AA-8A62-579BA7454221}" dt="2023-01-22T08:26:18.349" v="509" actId="1076"/>
+          <ac:picMkLst>
+            <pc:docMk/>
+            <pc:sldMk cId="946948079" sldId="280"/>
+            <ac:picMk id="4" creationId="{B3DC6838-2DC3-5548-61DF-98F22A448700}"/>
+          </ac:picMkLst>
+        </pc:picChg>
+      </pc:sldChg>
+    </pc:docChg>
+  </pc:docChgLst>
+</pc:chgInfo>
 </file>
 
 <file path=ppt/slideLayouts/slideLayout1.xml><?xml version="1.0" encoding="utf-8"?>
@@ -265,7 +864,7 @@
           <a:p>
             <a:fld id="{9C3C448E-0254-4288-96BD-F89271BBFAB0}" type="datetimeFigureOut">
               <a:rPr lang="zh-CN" altLang="en-US" smtClean="0"/>
-              <a:t>2023/1/18</a:t>
+              <a:t>2023/1/22</a:t>
             </a:fld>
             <a:endParaRPr lang="zh-CN" altLang="en-US"/>
           </a:p>
@@ -463,7 +1062,7 @@
           <a:p>
             <a:fld id="{9C3C448E-0254-4288-96BD-F89271BBFAB0}" type="datetimeFigureOut">
               <a:rPr lang="zh-CN" altLang="en-US" smtClean="0"/>
-              <a:t>2023/1/18</a:t>
+              <a:t>2023/1/22</a:t>
             </a:fld>
             <a:endParaRPr lang="zh-CN" altLang="en-US"/>
           </a:p>
@@ -671,7 +1270,7 @@
           <a:p>
             <a:fld id="{9C3C448E-0254-4288-96BD-F89271BBFAB0}" type="datetimeFigureOut">
               <a:rPr lang="zh-CN" altLang="en-US" smtClean="0"/>
-              <a:t>2023/1/18</a:t>
+              <a:t>2023/1/22</a:t>
             </a:fld>
             <a:endParaRPr lang="zh-CN" altLang="en-US"/>
           </a:p>
@@ -869,7 +1468,7 @@
           <a:p>
             <a:fld id="{9C3C448E-0254-4288-96BD-F89271BBFAB0}" type="datetimeFigureOut">
               <a:rPr lang="zh-CN" altLang="en-US" smtClean="0"/>
-              <a:t>2023/1/18</a:t>
+              <a:t>2023/1/22</a:t>
             </a:fld>
             <a:endParaRPr lang="zh-CN" altLang="en-US"/>
           </a:p>
@@ -1144,7 +1743,7 @@
           <a:p>
             <a:fld id="{9C3C448E-0254-4288-96BD-F89271BBFAB0}" type="datetimeFigureOut">
               <a:rPr lang="zh-CN" altLang="en-US" smtClean="0"/>
-              <a:t>2023/1/18</a:t>
+              <a:t>2023/1/22</a:t>
             </a:fld>
             <a:endParaRPr lang="zh-CN" altLang="en-US"/>
           </a:p>
@@ -1409,7 +2008,7 @@
           <a:p>
             <a:fld id="{9C3C448E-0254-4288-96BD-F89271BBFAB0}" type="datetimeFigureOut">
               <a:rPr lang="zh-CN" altLang="en-US" smtClean="0"/>
-              <a:t>2023/1/18</a:t>
+              <a:t>2023/1/22</a:t>
             </a:fld>
             <a:endParaRPr lang="zh-CN" altLang="en-US"/>
           </a:p>
@@ -1821,7 +2420,7 @@
           <a:p>
             <a:fld id="{9C3C448E-0254-4288-96BD-F89271BBFAB0}" type="datetimeFigureOut">
               <a:rPr lang="zh-CN" altLang="en-US" smtClean="0"/>
-              <a:t>2023/1/18</a:t>
+              <a:t>2023/1/22</a:t>
             </a:fld>
             <a:endParaRPr lang="zh-CN" altLang="en-US"/>
           </a:p>
@@ -1962,7 +2561,7 @@
           <a:p>
             <a:fld id="{9C3C448E-0254-4288-96BD-F89271BBFAB0}" type="datetimeFigureOut">
               <a:rPr lang="zh-CN" altLang="en-US" smtClean="0"/>
-              <a:t>2023/1/18</a:t>
+              <a:t>2023/1/22</a:t>
             </a:fld>
             <a:endParaRPr lang="zh-CN" altLang="en-US"/>
           </a:p>
@@ -2075,7 +2674,7 @@
           <a:p>
             <a:fld id="{9C3C448E-0254-4288-96BD-F89271BBFAB0}" type="datetimeFigureOut">
               <a:rPr lang="zh-CN" altLang="en-US" smtClean="0"/>
-              <a:t>2023/1/18</a:t>
+              <a:t>2023/1/22</a:t>
             </a:fld>
             <a:endParaRPr lang="zh-CN" altLang="en-US"/>
           </a:p>
@@ -2386,7 +2985,7 @@
           <a:p>
             <a:fld id="{9C3C448E-0254-4288-96BD-F89271BBFAB0}" type="datetimeFigureOut">
               <a:rPr lang="zh-CN" altLang="en-US" smtClean="0"/>
-              <a:t>2023/1/18</a:t>
+              <a:t>2023/1/22</a:t>
             </a:fld>
             <a:endParaRPr lang="zh-CN" altLang="en-US"/>
           </a:p>
@@ -2674,7 +3273,7 @@
           <a:p>
             <a:fld id="{9C3C448E-0254-4288-96BD-F89271BBFAB0}" type="datetimeFigureOut">
               <a:rPr lang="zh-CN" altLang="en-US" smtClean="0"/>
-              <a:t>2023/1/18</a:t>
+              <a:t>2023/1/22</a:t>
             </a:fld>
             <a:endParaRPr lang="zh-CN" altLang="en-US"/>
           </a:p>
@@ -2915,7 +3514,7 @@
           <a:p>
             <a:fld id="{9C3C448E-0254-4288-96BD-F89271BBFAB0}" type="datetimeFigureOut">
               <a:rPr lang="zh-CN" altLang="en-US" smtClean="0"/>
-              <a:t>2023/1/18</a:t>
+              <a:t>2023/1/22</a:t>
             </a:fld>
             <a:endParaRPr lang="zh-CN" altLang="en-US"/>
           </a:p>
@@ -3332,12 +3931,87 @@
           <a:chExt cx="0" cy="0"/>
         </a:xfrm>
       </p:grpSpPr>
+      <p:sp>
+        <p:nvSpPr>
+          <p:cNvPr id="2" name="文本框 1">
+            <a:extLst>
+              <a:ext uri="{FF2B5EF4-FFF2-40B4-BE49-F238E27FC236}">
+                <a16:creationId xmlns:a16="http://schemas.microsoft.com/office/drawing/2014/main" id="{278C3AE2-9179-F8F6-A05F-BA0FF896F3BA}"/>
+              </a:ext>
+            </a:extLst>
+          </p:cNvPr>
+          <p:cNvSpPr txBox="1"/>
+          <p:nvPr/>
+        </p:nvSpPr>
+        <p:spPr>
+          <a:xfrm>
+            <a:off x="3913632" y="2106777"/>
+            <a:ext cx="4718304" cy="923330"/>
+          </a:xfrm>
+          <a:prstGeom prst="rect">
+            <a:avLst/>
+          </a:prstGeom>
+          <a:noFill/>
+        </p:spPr>
+        <p:txBody>
+          <a:bodyPr wrap="square" rtlCol="0">
+            <a:spAutoFit/>
+          </a:bodyPr>
+          <a:lstStyle/>
+          <a:p>
+            <a:r>
+              <a:rPr lang="en-US" altLang="zh-CN" sz="5400" dirty="0">
+                <a:latin typeface="Times New Roman" panose="02020603050405020304" pitchFamily="18" charset="0"/>
+                <a:cs typeface="Times New Roman" panose="02020603050405020304" pitchFamily="18" charset="0"/>
+              </a:rPr>
+              <a:t>How to Use</a:t>
+            </a:r>
+            <a:r>
+              <a:rPr lang="zh-CN" altLang="en-US" sz="5400" dirty="0">
+                <a:latin typeface="Times New Roman" panose="02020603050405020304" pitchFamily="18" charset="0"/>
+                <a:cs typeface="Times New Roman" panose="02020603050405020304" pitchFamily="18" charset="0"/>
+              </a:rPr>
+              <a:t>？</a:t>
+            </a:r>
+          </a:p>
+        </p:txBody>
+      </p:sp>
+    </p:spTree>
+    <p:extLst>
+      <p:ext uri="{BB962C8B-B14F-4D97-AF65-F5344CB8AC3E}">
+        <p14:creationId xmlns:p14="http://schemas.microsoft.com/office/powerpoint/2010/main" val="2556340243"/>
+      </p:ext>
+    </p:extLst>
+  </p:cSld>
+  <p:clrMapOvr>
+    <a:masterClrMapping/>
+  </p:clrMapOvr>
+</p:sld>
+</file>
+
+<file path=ppt/slides/slide10.xml><?xml version="1.0" encoding="utf-8"?>
+<p:sld xmlns:a="http://schemas.openxmlformats.org/drawingml/2006/main" xmlns:r="http://schemas.openxmlformats.org/officeDocument/2006/relationships" xmlns:p="http://schemas.openxmlformats.org/presentationml/2006/main">
+  <p:cSld>
+    <p:spTree>
+      <p:nvGrpSpPr>
+        <p:cNvPr id="1" name=""/>
+        <p:cNvGrpSpPr/>
+        <p:nvPr/>
+      </p:nvGrpSpPr>
+      <p:grpSpPr>
+        <a:xfrm>
+          <a:off x="0" y="0"/>
+          <a:ext cx="0" cy="0"/>
+          <a:chOff x="0" y="0"/>
+          <a:chExt cx="0" cy="0"/>
+        </a:xfrm>
+      </p:grpSpPr>
       <p:pic>
         <p:nvPicPr>
           <p:cNvPr id="4" name="图片 3">
             <a:extLst>
               <a:ext uri="{FF2B5EF4-FFF2-40B4-BE49-F238E27FC236}">
-                <a16:creationId xmlns:a16="http://schemas.microsoft.com/office/drawing/2014/main" id="{78221E10-0922-282E-5047-0E3C0565B07E}"/>
+                <a16:creationId xmlns:a16="http://schemas.microsoft.com/office/drawing/2014/main" id="{90C024AE-F24B-2F4F-E354-04542C52A04E}"/>
               </a:ext>
             </a:extLst>
           </p:cNvPr>
@@ -3354,20 +4028,49 @@
         </p:blipFill>
         <p:spPr>
           <a:xfrm>
-            <a:off x="253467" y="0"/>
-            <a:ext cx="11685065" cy="6858000"/>
+            <a:off x="0" y="0"/>
+            <a:ext cx="6311920" cy="3429000"/>
           </a:xfrm>
           <a:prstGeom prst="rect">
             <a:avLst/>
           </a:prstGeom>
         </p:spPr>
       </p:pic>
+      <p:pic>
+        <p:nvPicPr>
+          <p:cNvPr id="3" name="图片 2">
+            <a:extLst>
+              <a:ext uri="{FF2B5EF4-FFF2-40B4-BE49-F238E27FC236}">
+                <a16:creationId xmlns:a16="http://schemas.microsoft.com/office/drawing/2014/main" id="{8649F0B6-1C5D-0C85-9C5D-BA7C08658856}"/>
+              </a:ext>
+            </a:extLst>
+          </p:cNvPr>
+          <p:cNvPicPr>
+            <a:picLocks noChangeAspect="1"/>
+          </p:cNvPicPr>
+          <p:nvPr/>
+        </p:nvPicPr>
+        <p:blipFill rotWithShape="1">
+          <a:blip r:embed="rId3"/>
+          <a:srcRect l="8100" t="22877"/>
+          <a:stretch/>
+        </p:blipFill>
+        <p:spPr>
+          <a:xfrm>
+            <a:off x="4360244" y="3003082"/>
+            <a:ext cx="7539965" cy="3854918"/>
+          </a:xfrm>
+          <a:prstGeom prst="rect">
+            <a:avLst/>
+          </a:prstGeom>
+        </p:spPr>
+      </p:pic>
       <p:sp>
         <p:nvSpPr>
           <p:cNvPr id="5" name="矩形: 圆角 4">
             <a:extLst>
               <a:ext uri="{FF2B5EF4-FFF2-40B4-BE49-F238E27FC236}">
-                <a16:creationId xmlns:a16="http://schemas.microsoft.com/office/drawing/2014/main" id="{A1366CC3-1616-C8CF-7E8D-5B8064C607B4}"/>
+                <a16:creationId xmlns:a16="http://schemas.microsoft.com/office/drawing/2014/main" id="{41FF02CD-5A6B-DDBA-D966-8C0EFBABA9F3}"/>
               </a:ext>
             </a:extLst>
           </p:cNvPr>
@@ -3376,8 +4079,8 @@
         </p:nvSpPr>
         <p:spPr>
           <a:xfrm>
-            <a:off x="895149" y="5428648"/>
-            <a:ext cx="1270535" cy="298384"/>
+            <a:off x="8598570" y="3621505"/>
+            <a:ext cx="1344327" cy="796491"/>
           </a:xfrm>
           <a:prstGeom prst="roundRect">
             <a:avLst/>
@@ -3416,10 +4119,49 @@
           </a:p>
         </p:txBody>
       </p:sp>
+      <p:cxnSp>
+        <p:nvCxnSpPr>
+          <p:cNvPr id="8" name="直接箭头连接符 7">
+            <a:extLst>
+              <a:ext uri="{FF2B5EF4-FFF2-40B4-BE49-F238E27FC236}">
+                <a16:creationId xmlns:a16="http://schemas.microsoft.com/office/drawing/2014/main" id="{B4914EA9-0987-7D46-263D-D623B93F95CE}"/>
+              </a:ext>
+            </a:extLst>
+          </p:cNvPr>
+          <p:cNvCxnSpPr/>
+          <p:nvPr/>
+        </p:nvCxnSpPr>
+        <p:spPr>
+          <a:xfrm flipH="1" flipV="1">
+            <a:off x="3724977" y="2762451"/>
+            <a:ext cx="4889634" cy="914400"/>
+          </a:xfrm>
+          <a:prstGeom prst="straightConnector1">
+            <a:avLst/>
+          </a:prstGeom>
+          <a:ln w="28575">
+            <a:tailEnd type="triangle"/>
+          </a:ln>
+        </p:spPr>
+        <p:style>
+          <a:lnRef idx="1">
+            <a:schemeClr val="accent2"/>
+          </a:lnRef>
+          <a:fillRef idx="0">
+            <a:schemeClr val="accent2"/>
+          </a:fillRef>
+          <a:effectRef idx="0">
+            <a:schemeClr val="accent2"/>
+          </a:effectRef>
+          <a:fontRef idx="minor">
+            <a:schemeClr val="tx1"/>
+          </a:fontRef>
+        </p:style>
+      </p:cxnSp>
     </p:spTree>
     <p:extLst>
       <p:ext uri="{BB962C8B-B14F-4D97-AF65-F5344CB8AC3E}">
-        <p14:creationId xmlns:p14="http://schemas.microsoft.com/office/powerpoint/2010/main" val="1305158503"/>
+        <p14:creationId xmlns:p14="http://schemas.microsoft.com/office/powerpoint/2010/main" val="262489796"/>
       </p:ext>
     </p:extLst>
   </p:cSld>
@@ -3515,7 +4257,7 @@
 </p:sld>
 </file>
 
-<file path=ppt/slides/slide10.xml><?xml version="1.0" encoding="utf-8"?>
+<file path=ppt/slides/slide11.xml><?xml version="1.0" encoding="utf-8"?>
 <p:sld xmlns:a="http://schemas.openxmlformats.org/drawingml/2006/main" xmlns:r="http://schemas.openxmlformats.org/officeDocument/2006/relationships" xmlns:p="http://schemas.openxmlformats.org/presentationml/2006/main">
   <p:cSld>
     <p:spTree>
@@ -3885,7 +4627,7 @@
 </p:sld>
 </file>
 
-<file path=ppt/slides/slide11.xml><?xml version="1.0" encoding="utf-8"?>
+<file path=ppt/slides/slide12.xml><?xml version="1.0" encoding="utf-8"?>
 <p:sld xmlns:a="http://schemas.openxmlformats.org/drawingml/2006/main" xmlns:r="http://schemas.openxmlformats.org/officeDocument/2006/relationships" xmlns:p="http://schemas.openxmlformats.org/presentationml/2006/main">
   <p:cSld>
     <p:spTree>
@@ -4085,7 +4827,7 @@
 </p:sld>
 </file>
 
-<file path=ppt/slides/slide12.xml><?xml version="1.0" encoding="utf-8"?>
+<file path=ppt/slides/slide13.xml><?xml version="1.0" encoding="utf-8"?>
 <p:sld xmlns:a="http://schemas.openxmlformats.org/drawingml/2006/main" xmlns:r="http://schemas.openxmlformats.org/officeDocument/2006/relationships" xmlns:p="http://schemas.openxmlformats.org/presentationml/2006/main">
   <p:cSld>
     <p:spTree>
@@ -4136,6 +4878,911 @@
     <p:extLst>
       <p:ext uri="{BB962C8B-B14F-4D97-AF65-F5344CB8AC3E}">
         <p14:creationId xmlns:p14="http://schemas.microsoft.com/office/powerpoint/2010/main" val="3990909576"/>
+      </p:ext>
+    </p:extLst>
+  </p:cSld>
+  <p:clrMapOvr>
+    <a:masterClrMapping/>
+  </p:clrMapOvr>
+</p:sld>
+</file>
+
+<file path=ppt/slides/slide14.xml><?xml version="1.0" encoding="utf-8"?>
+<p:sld xmlns:a="http://schemas.openxmlformats.org/drawingml/2006/main" xmlns:r="http://schemas.openxmlformats.org/officeDocument/2006/relationships" xmlns:p="http://schemas.openxmlformats.org/presentationml/2006/main">
+  <p:cSld>
+    <p:spTree>
+      <p:nvGrpSpPr>
+        <p:cNvPr id="1" name=""/>
+        <p:cNvGrpSpPr/>
+        <p:nvPr/>
+      </p:nvGrpSpPr>
+      <p:grpSpPr>
+        <a:xfrm>
+          <a:off x="0" y="0"/>
+          <a:ext cx="0" cy="0"/>
+          <a:chOff x="0" y="0"/>
+          <a:chExt cx="0" cy="0"/>
+        </a:xfrm>
+      </p:grpSpPr>
+      <p:sp>
+        <p:nvSpPr>
+          <p:cNvPr id="2" name="文本框 1">
+            <a:extLst>
+              <a:ext uri="{FF2B5EF4-FFF2-40B4-BE49-F238E27FC236}">
+                <a16:creationId xmlns:a16="http://schemas.microsoft.com/office/drawing/2014/main" id="{278C3AE2-9179-F8F6-A05F-BA0FF896F3BA}"/>
+              </a:ext>
+            </a:extLst>
+          </p:cNvPr>
+          <p:cNvSpPr txBox="1"/>
+          <p:nvPr/>
+        </p:nvSpPr>
+        <p:spPr>
+          <a:xfrm>
+            <a:off x="3384243" y="2376285"/>
+            <a:ext cx="6462402" cy="923330"/>
+          </a:xfrm>
+          <a:prstGeom prst="rect">
+            <a:avLst/>
+          </a:prstGeom>
+          <a:noFill/>
+        </p:spPr>
+        <p:txBody>
+          <a:bodyPr wrap="square" rtlCol="0">
+            <a:spAutoFit/>
+          </a:bodyPr>
+          <a:lstStyle/>
+          <a:p>
+            <a:r>
+              <a:rPr lang="en-US" altLang="zh-CN" sz="5400" dirty="0">
+                <a:latin typeface="Times New Roman" panose="02020603050405020304" pitchFamily="18" charset="0"/>
+                <a:cs typeface="Times New Roman" panose="02020603050405020304" pitchFamily="18" charset="0"/>
+              </a:rPr>
+              <a:t>How does it Work</a:t>
+            </a:r>
+            <a:r>
+              <a:rPr lang="zh-CN" altLang="en-US" sz="5400" dirty="0">
+                <a:latin typeface="Times New Roman" panose="02020603050405020304" pitchFamily="18" charset="0"/>
+                <a:cs typeface="Times New Roman" panose="02020603050405020304" pitchFamily="18" charset="0"/>
+              </a:rPr>
+              <a:t>？</a:t>
+            </a:r>
+          </a:p>
+        </p:txBody>
+      </p:sp>
+    </p:spTree>
+    <p:extLst>
+      <p:ext uri="{BB962C8B-B14F-4D97-AF65-F5344CB8AC3E}">
+        <p14:creationId xmlns:p14="http://schemas.microsoft.com/office/powerpoint/2010/main" val="3994603650"/>
+      </p:ext>
+    </p:extLst>
+  </p:cSld>
+  <p:clrMapOvr>
+    <a:masterClrMapping/>
+  </p:clrMapOvr>
+</p:sld>
+</file>
+
+<file path=ppt/slides/slide15.xml><?xml version="1.0" encoding="utf-8"?>
+<p:sld xmlns:a="http://schemas.openxmlformats.org/drawingml/2006/main" xmlns:r="http://schemas.openxmlformats.org/officeDocument/2006/relationships" xmlns:p="http://schemas.openxmlformats.org/presentationml/2006/main">
+  <p:cSld>
+    <p:spTree>
+      <p:nvGrpSpPr>
+        <p:cNvPr id="1" name=""/>
+        <p:cNvGrpSpPr/>
+        <p:nvPr/>
+      </p:nvGrpSpPr>
+      <p:grpSpPr>
+        <a:xfrm>
+          <a:off x="0" y="0"/>
+          <a:ext cx="0" cy="0"/>
+          <a:chOff x="0" y="0"/>
+          <a:chExt cx="0" cy="0"/>
+        </a:xfrm>
+      </p:grpSpPr>
+      <p:sp>
+        <p:nvSpPr>
+          <p:cNvPr id="2" name="文本框 1">
+            <a:extLst>
+              <a:ext uri="{FF2B5EF4-FFF2-40B4-BE49-F238E27FC236}">
+                <a16:creationId xmlns:a16="http://schemas.microsoft.com/office/drawing/2014/main" id="{278C3AE2-9179-F8F6-A05F-BA0FF896F3BA}"/>
+              </a:ext>
+            </a:extLst>
+          </p:cNvPr>
+          <p:cNvSpPr txBox="1"/>
+          <p:nvPr/>
+        </p:nvSpPr>
+        <p:spPr>
+          <a:xfrm>
+            <a:off x="284909" y="188233"/>
+            <a:ext cx="6462402" cy="584775"/>
+          </a:xfrm>
+          <a:prstGeom prst="rect">
+            <a:avLst/>
+          </a:prstGeom>
+          <a:noFill/>
+        </p:spPr>
+        <p:txBody>
+          <a:bodyPr wrap="square" rtlCol="0">
+            <a:spAutoFit/>
+          </a:bodyPr>
+          <a:lstStyle/>
+          <a:p>
+            <a:r>
+              <a:rPr lang="en-US" altLang="zh-CN" sz="3200" dirty="0">
+                <a:latin typeface="Times New Roman" panose="02020603050405020304" pitchFamily="18" charset="0"/>
+                <a:cs typeface="Times New Roman" panose="02020603050405020304" pitchFamily="18" charset="0"/>
+              </a:rPr>
+              <a:t>Step1: </a:t>
+            </a:r>
+            <a:r>
+              <a:rPr lang="zh-CN" altLang="en-US" sz="3200" dirty="0">
+                <a:latin typeface="Times New Roman" panose="02020603050405020304" pitchFamily="18" charset="0"/>
+                <a:cs typeface="Times New Roman" panose="02020603050405020304" pitchFamily="18" charset="0"/>
+              </a:rPr>
+              <a:t>初始化连接，得到</a:t>
+            </a:r>
+            <a:r>
+              <a:rPr lang="en-US" altLang="zh-CN" sz="3200" dirty="0" err="1">
+                <a:latin typeface="Times New Roman" panose="02020603050405020304" pitchFamily="18" charset="0"/>
+                <a:cs typeface="Times New Roman" panose="02020603050405020304" pitchFamily="18" charset="0"/>
+              </a:rPr>
+              <a:t>vrep</a:t>
+            </a:r>
+            <a:r>
+              <a:rPr lang="zh-CN" altLang="en-US" sz="3200" dirty="0">
+                <a:latin typeface="Times New Roman" panose="02020603050405020304" pitchFamily="18" charset="0"/>
+                <a:cs typeface="Times New Roman" panose="02020603050405020304" pitchFamily="18" charset="0"/>
+              </a:rPr>
+              <a:t>对象</a:t>
+            </a:r>
+          </a:p>
+        </p:txBody>
+      </p:sp>
+      <p:pic>
+        <p:nvPicPr>
+          <p:cNvPr id="4" name="图片 3">
+            <a:extLst>
+              <a:ext uri="{FF2B5EF4-FFF2-40B4-BE49-F238E27FC236}">
+                <a16:creationId xmlns:a16="http://schemas.microsoft.com/office/drawing/2014/main" id="{B3DC6838-2DC3-5548-61DF-98F22A448700}"/>
+              </a:ext>
+            </a:extLst>
+          </p:cNvPr>
+          <p:cNvPicPr>
+            <a:picLocks noChangeAspect="1"/>
+          </p:cNvPicPr>
+          <p:nvPr/>
+        </p:nvPicPr>
+        <p:blipFill>
+          <a:blip r:embed="rId2"/>
+          <a:stretch>
+            <a:fillRect/>
+          </a:stretch>
+        </p:blipFill>
+        <p:spPr>
+          <a:xfrm>
+            <a:off x="899737" y="970007"/>
+            <a:ext cx="10465787" cy="5699760"/>
+          </a:xfrm>
+          <a:prstGeom prst="rect">
+            <a:avLst/>
+          </a:prstGeom>
+        </p:spPr>
+      </p:pic>
+    </p:spTree>
+    <p:extLst>
+      <p:ext uri="{BB962C8B-B14F-4D97-AF65-F5344CB8AC3E}">
+        <p14:creationId xmlns:p14="http://schemas.microsoft.com/office/powerpoint/2010/main" val="946948079"/>
+      </p:ext>
+    </p:extLst>
+  </p:cSld>
+  <p:clrMapOvr>
+    <a:masterClrMapping/>
+  </p:clrMapOvr>
+</p:sld>
+</file>
+
+<file path=ppt/slides/slide16.xml><?xml version="1.0" encoding="utf-8"?>
+<p:sld xmlns:a="http://schemas.openxmlformats.org/drawingml/2006/main" xmlns:r="http://schemas.openxmlformats.org/officeDocument/2006/relationships" xmlns:p="http://schemas.openxmlformats.org/presentationml/2006/main">
+  <p:cSld>
+    <p:spTree>
+      <p:nvGrpSpPr>
+        <p:cNvPr id="1" name=""/>
+        <p:cNvGrpSpPr/>
+        <p:nvPr/>
+      </p:nvGrpSpPr>
+      <p:grpSpPr>
+        <a:xfrm>
+          <a:off x="0" y="0"/>
+          <a:ext cx="0" cy="0"/>
+          <a:chOff x="0" y="0"/>
+          <a:chExt cx="0" cy="0"/>
+        </a:xfrm>
+      </p:grpSpPr>
+      <p:sp>
+        <p:nvSpPr>
+          <p:cNvPr id="2" name="文本框 1">
+            <a:extLst>
+              <a:ext uri="{FF2B5EF4-FFF2-40B4-BE49-F238E27FC236}">
+                <a16:creationId xmlns:a16="http://schemas.microsoft.com/office/drawing/2014/main" id="{278C3AE2-9179-F8F6-A05F-BA0FF896F3BA}"/>
+              </a:ext>
+            </a:extLst>
+          </p:cNvPr>
+          <p:cNvSpPr txBox="1"/>
+          <p:nvPr/>
+        </p:nvSpPr>
+        <p:spPr>
+          <a:xfrm>
+            <a:off x="284909" y="188233"/>
+            <a:ext cx="6462402" cy="584775"/>
+          </a:xfrm>
+          <a:prstGeom prst="rect">
+            <a:avLst/>
+          </a:prstGeom>
+          <a:noFill/>
+        </p:spPr>
+        <p:txBody>
+          <a:bodyPr wrap="square" rtlCol="0">
+            <a:spAutoFit/>
+          </a:bodyPr>
+          <a:lstStyle/>
+          <a:p>
+            <a:r>
+              <a:rPr lang="en-US" altLang="zh-CN" sz="3200" dirty="0">
+                <a:latin typeface="Times New Roman" panose="02020603050405020304" pitchFamily="18" charset="0"/>
+                <a:cs typeface="Times New Roman" panose="02020603050405020304" pitchFamily="18" charset="0"/>
+              </a:rPr>
+              <a:t>Step1: </a:t>
+            </a:r>
+            <a:r>
+              <a:rPr lang="zh-CN" altLang="en-US" sz="3200" dirty="0">
+                <a:latin typeface="Times New Roman" panose="02020603050405020304" pitchFamily="18" charset="0"/>
+                <a:cs typeface="Times New Roman" panose="02020603050405020304" pitchFamily="18" charset="0"/>
+              </a:rPr>
+              <a:t>初始化连接，得到</a:t>
+            </a:r>
+            <a:r>
+              <a:rPr lang="en-US" altLang="zh-CN" sz="3200" dirty="0" err="1">
+                <a:latin typeface="Times New Roman" panose="02020603050405020304" pitchFamily="18" charset="0"/>
+                <a:cs typeface="Times New Roman" panose="02020603050405020304" pitchFamily="18" charset="0"/>
+              </a:rPr>
+              <a:t>vrep</a:t>
+            </a:r>
+            <a:r>
+              <a:rPr lang="zh-CN" altLang="en-US" sz="3200" dirty="0">
+                <a:latin typeface="Times New Roman" panose="02020603050405020304" pitchFamily="18" charset="0"/>
+                <a:cs typeface="Times New Roman" panose="02020603050405020304" pitchFamily="18" charset="0"/>
+              </a:rPr>
+              <a:t>对象</a:t>
+            </a:r>
+          </a:p>
+        </p:txBody>
+      </p:sp>
+      <p:pic>
+        <p:nvPicPr>
+          <p:cNvPr id="3" name="图片 2">
+            <a:extLst>
+              <a:ext uri="{FF2B5EF4-FFF2-40B4-BE49-F238E27FC236}">
+                <a16:creationId xmlns:a16="http://schemas.microsoft.com/office/drawing/2014/main" id="{F05659D1-E06C-C938-72A7-8BEA576D0F8F}"/>
+              </a:ext>
+            </a:extLst>
+          </p:cNvPr>
+          <p:cNvPicPr>
+            <a:picLocks noChangeAspect="1"/>
+          </p:cNvPicPr>
+          <p:nvPr/>
+        </p:nvPicPr>
+        <p:blipFill>
+          <a:blip r:embed="rId2"/>
+          <a:stretch>
+            <a:fillRect/>
+          </a:stretch>
+        </p:blipFill>
+        <p:spPr>
+          <a:xfrm>
+            <a:off x="2088682" y="961131"/>
+            <a:ext cx="8790472" cy="5824140"/>
+          </a:xfrm>
+          <a:prstGeom prst="rect">
+            <a:avLst/>
+          </a:prstGeom>
+        </p:spPr>
+      </p:pic>
+    </p:spTree>
+    <p:extLst>
+      <p:ext uri="{BB962C8B-B14F-4D97-AF65-F5344CB8AC3E}">
+        <p14:creationId xmlns:p14="http://schemas.microsoft.com/office/powerpoint/2010/main" val="3076750160"/>
+      </p:ext>
+    </p:extLst>
+  </p:cSld>
+  <p:clrMapOvr>
+    <a:masterClrMapping/>
+  </p:clrMapOvr>
+</p:sld>
+</file>
+
+<file path=ppt/slides/slide17.xml><?xml version="1.0" encoding="utf-8"?>
+<p:sld xmlns:a="http://schemas.openxmlformats.org/drawingml/2006/main" xmlns:r="http://schemas.openxmlformats.org/officeDocument/2006/relationships" xmlns:p="http://schemas.openxmlformats.org/presentationml/2006/main">
+  <p:cSld>
+    <p:spTree>
+      <p:nvGrpSpPr>
+        <p:cNvPr id="1" name=""/>
+        <p:cNvGrpSpPr/>
+        <p:nvPr/>
+      </p:nvGrpSpPr>
+      <p:grpSpPr>
+        <a:xfrm>
+          <a:off x="0" y="0"/>
+          <a:ext cx="0" cy="0"/>
+          <a:chOff x="0" y="0"/>
+          <a:chExt cx="0" cy="0"/>
+        </a:xfrm>
+      </p:grpSpPr>
+      <p:sp>
+        <p:nvSpPr>
+          <p:cNvPr id="2" name="文本框 1">
+            <a:extLst>
+              <a:ext uri="{FF2B5EF4-FFF2-40B4-BE49-F238E27FC236}">
+                <a16:creationId xmlns:a16="http://schemas.microsoft.com/office/drawing/2014/main" id="{278C3AE2-9179-F8F6-A05F-BA0FF896F3BA}"/>
+              </a:ext>
+            </a:extLst>
+          </p:cNvPr>
+          <p:cNvSpPr txBox="1"/>
+          <p:nvPr/>
+        </p:nvSpPr>
+        <p:spPr>
+          <a:xfrm>
+            <a:off x="284909" y="188233"/>
+            <a:ext cx="6462402" cy="584775"/>
+          </a:xfrm>
+          <a:prstGeom prst="rect">
+            <a:avLst/>
+          </a:prstGeom>
+          <a:noFill/>
+        </p:spPr>
+        <p:txBody>
+          <a:bodyPr wrap="square" rtlCol="0">
+            <a:spAutoFit/>
+          </a:bodyPr>
+          <a:lstStyle/>
+          <a:p>
+            <a:r>
+              <a:rPr lang="en-US" altLang="zh-CN" sz="3200" dirty="0">
+                <a:latin typeface="Times New Roman" panose="02020603050405020304" pitchFamily="18" charset="0"/>
+                <a:cs typeface="Times New Roman" panose="02020603050405020304" pitchFamily="18" charset="0"/>
+              </a:rPr>
+              <a:t>Step2: </a:t>
+            </a:r>
+            <a:r>
+              <a:rPr lang="zh-CN" altLang="en-US" sz="3200" dirty="0">
+                <a:latin typeface="Times New Roman" panose="02020603050405020304" pitchFamily="18" charset="0"/>
+                <a:cs typeface="Times New Roman" panose="02020603050405020304" pitchFamily="18" charset="0"/>
+              </a:rPr>
+              <a:t>同步触发器</a:t>
+            </a:r>
+          </a:p>
+        </p:txBody>
+      </p:sp>
+      <p:pic>
+        <p:nvPicPr>
+          <p:cNvPr id="4" name="图片 3">
+            <a:extLst>
+              <a:ext uri="{FF2B5EF4-FFF2-40B4-BE49-F238E27FC236}">
+                <a16:creationId xmlns:a16="http://schemas.microsoft.com/office/drawing/2014/main" id="{5F409424-E2EA-C118-664D-156E9582A860}"/>
+              </a:ext>
+            </a:extLst>
+          </p:cNvPr>
+          <p:cNvPicPr>
+            <a:picLocks noChangeAspect="1"/>
+          </p:cNvPicPr>
+          <p:nvPr/>
+        </p:nvPicPr>
+        <p:blipFill>
+          <a:blip r:embed="rId2"/>
+          <a:stretch>
+            <a:fillRect/>
+          </a:stretch>
+        </p:blipFill>
+        <p:spPr>
+          <a:xfrm>
+            <a:off x="983180" y="1316461"/>
+            <a:ext cx="2095500" cy="1076325"/>
+          </a:xfrm>
+          <a:prstGeom prst="rect">
+            <a:avLst/>
+          </a:prstGeom>
+        </p:spPr>
+      </p:pic>
+      <p:pic>
+        <p:nvPicPr>
+          <p:cNvPr id="5" name="图片 4">
+            <a:extLst>
+              <a:ext uri="{FF2B5EF4-FFF2-40B4-BE49-F238E27FC236}">
+                <a16:creationId xmlns:a16="http://schemas.microsoft.com/office/drawing/2014/main" id="{40927F9E-9AE7-6817-BC99-6B0FAA6F179A}"/>
+              </a:ext>
+            </a:extLst>
+          </p:cNvPr>
+          <p:cNvPicPr>
+            <a:picLocks noChangeAspect="1"/>
+          </p:cNvPicPr>
+          <p:nvPr/>
+        </p:nvPicPr>
+        <p:blipFill>
+          <a:blip r:embed="rId3"/>
+          <a:stretch>
+            <a:fillRect/>
+          </a:stretch>
+        </p:blipFill>
+        <p:spPr>
+          <a:xfrm>
+            <a:off x="4155640" y="2936240"/>
+            <a:ext cx="1571625" cy="533400"/>
+          </a:xfrm>
+          <a:prstGeom prst="rect">
+            <a:avLst/>
+          </a:prstGeom>
+        </p:spPr>
+      </p:pic>
+      <p:pic>
+        <p:nvPicPr>
+          <p:cNvPr id="3" name="图片 2">
+            <a:extLst>
+              <a:ext uri="{FF2B5EF4-FFF2-40B4-BE49-F238E27FC236}">
+                <a16:creationId xmlns:a16="http://schemas.microsoft.com/office/drawing/2014/main" id="{FB943B32-F53D-A5D5-6914-67CDF551AD66}"/>
+              </a:ext>
+            </a:extLst>
+          </p:cNvPr>
+          <p:cNvPicPr>
+            <a:picLocks noChangeAspect="1"/>
+          </p:cNvPicPr>
+          <p:nvPr/>
+        </p:nvPicPr>
+        <p:blipFill rotWithShape="1">
+          <a:blip r:embed="rId4"/>
+          <a:srcRect l="35431"/>
+          <a:stretch/>
+        </p:blipFill>
+        <p:spPr>
+          <a:xfrm>
+            <a:off x="5327762" y="480620"/>
+            <a:ext cx="6768790" cy="5896759"/>
+          </a:xfrm>
+          <a:prstGeom prst="rect">
+            <a:avLst/>
+          </a:prstGeom>
+        </p:spPr>
+      </p:pic>
+      <p:pic>
+        <p:nvPicPr>
+          <p:cNvPr id="7" name="图片 6">
+            <a:extLst>
+              <a:ext uri="{FF2B5EF4-FFF2-40B4-BE49-F238E27FC236}">
+                <a16:creationId xmlns:a16="http://schemas.microsoft.com/office/drawing/2014/main" id="{A278E51E-7DDD-26FA-AC6D-6BA700E8763C}"/>
+              </a:ext>
+            </a:extLst>
+          </p:cNvPr>
+          <p:cNvPicPr>
+            <a:picLocks noChangeAspect="1"/>
+          </p:cNvPicPr>
+          <p:nvPr/>
+        </p:nvPicPr>
+        <p:blipFill>
+          <a:blip r:embed="rId5"/>
+          <a:stretch>
+            <a:fillRect/>
+          </a:stretch>
+        </p:blipFill>
+        <p:spPr>
+          <a:xfrm>
+            <a:off x="161488" y="2532092"/>
+            <a:ext cx="4090027" cy="3733527"/>
+          </a:xfrm>
+          <a:prstGeom prst="rect">
+            <a:avLst/>
+          </a:prstGeom>
+        </p:spPr>
+      </p:pic>
+    </p:spTree>
+    <p:extLst>
+      <p:ext uri="{BB962C8B-B14F-4D97-AF65-F5344CB8AC3E}">
+        <p14:creationId xmlns:p14="http://schemas.microsoft.com/office/powerpoint/2010/main" val="2197385518"/>
+      </p:ext>
+    </p:extLst>
+  </p:cSld>
+  <p:clrMapOvr>
+    <a:masterClrMapping/>
+  </p:clrMapOvr>
+</p:sld>
+</file>
+
+<file path=ppt/slides/slide18.xml><?xml version="1.0" encoding="utf-8"?>
+<p:sld xmlns:a="http://schemas.openxmlformats.org/drawingml/2006/main" xmlns:r="http://schemas.openxmlformats.org/officeDocument/2006/relationships" xmlns:p="http://schemas.openxmlformats.org/presentationml/2006/main">
+  <p:cSld>
+    <p:spTree>
+      <p:nvGrpSpPr>
+        <p:cNvPr id="1" name=""/>
+        <p:cNvGrpSpPr/>
+        <p:nvPr/>
+      </p:nvGrpSpPr>
+      <p:grpSpPr>
+        <a:xfrm>
+          <a:off x="0" y="0"/>
+          <a:ext cx="0" cy="0"/>
+          <a:chOff x="0" y="0"/>
+          <a:chExt cx="0" cy="0"/>
+        </a:xfrm>
+      </p:grpSpPr>
+      <p:sp>
+        <p:nvSpPr>
+          <p:cNvPr id="2" name="文本框 1">
+            <a:extLst>
+              <a:ext uri="{FF2B5EF4-FFF2-40B4-BE49-F238E27FC236}">
+                <a16:creationId xmlns:a16="http://schemas.microsoft.com/office/drawing/2014/main" id="{278C3AE2-9179-F8F6-A05F-BA0FF896F3BA}"/>
+              </a:ext>
+            </a:extLst>
+          </p:cNvPr>
+          <p:cNvSpPr txBox="1"/>
+          <p:nvPr/>
+        </p:nvSpPr>
+        <p:spPr>
+          <a:xfrm>
+            <a:off x="284909" y="188233"/>
+            <a:ext cx="6462402" cy="584775"/>
+          </a:xfrm>
+          <a:prstGeom prst="rect">
+            <a:avLst/>
+          </a:prstGeom>
+          <a:noFill/>
+        </p:spPr>
+        <p:txBody>
+          <a:bodyPr wrap="square" rtlCol="0">
+            <a:spAutoFit/>
+          </a:bodyPr>
+          <a:lstStyle/>
+          <a:p>
+            <a:r>
+              <a:rPr lang="en-US" altLang="zh-CN" sz="3200" dirty="0">
+                <a:latin typeface="Times New Roman" panose="02020603050405020304" pitchFamily="18" charset="0"/>
+                <a:cs typeface="Times New Roman" panose="02020603050405020304" pitchFamily="18" charset="0"/>
+              </a:rPr>
+              <a:t>Step2: </a:t>
+            </a:r>
+            <a:r>
+              <a:rPr lang="zh-CN" altLang="en-US" sz="3200" dirty="0">
+                <a:latin typeface="Times New Roman" panose="02020603050405020304" pitchFamily="18" charset="0"/>
+                <a:cs typeface="Times New Roman" panose="02020603050405020304" pitchFamily="18" charset="0"/>
+              </a:rPr>
+              <a:t>同步触发器</a:t>
+            </a:r>
+          </a:p>
+        </p:txBody>
+      </p:sp>
+      <p:pic>
+        <p:nvPicPr>
+          <p:cNvPr id="4" name="图片 3">
+            <a:extLst>
+              <a:ext uri="{FF2B5EF4-FFF2-40B4-BE49-F238E27FC236}">
+                <a16:creationId xmlns:a16="http://schemas.microsoft.com/office/drawing/2014/main" id="{5F409424-E2EA-C118-664D-156E9582A860}"/>
+              </a:ext>
+            </a:extLst>
+          </p:cNvPr>
+          <p:cNvPicPr>
+            <a:picLocks noChangeAspect="1"/>
+          </p:cNvPicPr>
+          <p:nvPr/>
+        </p:nvPicPr>
+        <p:blipFill>
+          <a:blip r:embed="rId2"/>
+          <a:stretch>
+            <a:fillRect/>
+          </a:stretch>
+        </p:blipFill>
+        <p:spPr>
+          <a:xfrm>
+            <a:off x="1227020" y="2685048"/>
+            <a:ext cx="2095500" cy="1076325"/>
+          </a:xfrm>
+          <a:prstGeom prst="rect">
+            <a:avLst/>
+          </a:prstGeom>
+        </p:spPr>
+      </p:pic>
+      <p:pic>
+        <p:nvPicPr>
+          <p:cNvPr id="5" name="图片 4">
+            <a:extLst>
+              <a:ext uri="{FF2B5EF4-FFF2-40B4-BE49-F238E27FC236}">
+                <a16:creationId xmlns:a16="http://schemas.microsoft.com/office/drawing/2014/main" id="{40927F9E-9AE7-6817-BC99-6B0FAA6F179A}"/>
+              </a:ext>
+            </a:extLst>
+          </p:cNvPr>
+          <p:cNvPicPr>
+            <a:picLocks noChangeAspect="1"/>
+          </p:cNvPicPr>
+          <p:nvPr/>
+        </p:nvPicPr>
+        <p:blipFill>
+          <a:blip r:embed="rId3"/>
+          <a:stretch>
+            <a:fillRect/>
+          </a:stretch>
+        </p:blipFill>
+        <p:spPr>
+          <a:xfrm>
+            <a:off x="3322520" y="2895600"/>
+            <a:ext cx="1571625" cy="533400"/>
+          </a:xfrm>
+          <a:prstGeom prst="rect">
+            <a:avLst/>
+          </a:prstGeom>
+        </p:spPr>
+      </p:pic>
+      <p:pic>
+        <p:nvPicPr>
+          <p:cNvPr id="6" name="图片 5">
+            <a:extLst>
+              <a:ext uri="{FF2B5EF4-FFF2-40B4-BE49-F238E27FC236}">
+                <a16:creationId xmlns:a16="http://schemas.microsoft.com/office/drawing/2014/main" id="{F04E4393-FA8B-4FB0-C179-B30DB2A2838E}"/>
+              </a:ext>
+            </a:extLst>
+          </p:cNvPr>
+          <p:cNvPicPr>
+            <a:picLocks noChangeAspect="1"/>
+          </p:cNvPicPr>
+          <p:nvPr/>
+        </p:nvPicPr>
+        <p:blipFill>
+          <a:blip r:embed="rId4"/>
+          <a:stretch>
+            <a:fillRect/>
+          </a:stretch>
+        </p:blipFill>
+        <p:spPr>
+          <a:xfrm>
+            <a:off x="5121199" y="-10878"/>
+            <a:ext cx="6627479" cy="6858000"/>
+          </a:xfrm>
+          <a:prstGeom prst="rect">
+            <a:avLst/>
+          </a:prstGeom>
+        </p:spPr>
+      </p:pic>
+    </p:spTree>
+    <p:extLst>
+      <p:ext uri="{BB962C8B-B14F-4D97-AF65-F5344CB8AC3E}">
+        <p14:creationId xmlns:p14="http://schemas.microsoft.com/office/powerpoint/2010/main" val="3126281903"/>
+      </p:ext>
+    </p:extLst>
+  </p:cSld>
+  <p:clrMapOvr>
+    <a:masterClrMapping/>
+  </p:clrMapOvr>
+</p:sld>
+</file>
+
+<file path=ppt/slides/slide19.xml><?xml version="1.0" encoding="utf-8"?>
+<p:sld xmlns:a="http://schemas.openxmlformats.org/drawingml/2006/main" xmlns:r="http://schemas.openxmlformats.org/officeDocument/2006/relationships" xmlns:p="http://schemas.openxmlformats.org/presentationml/2006/main">
+  <p:cSld>
+    <p:spTree>
+      <p:nvGrpSpPr>
+        <p:cNvPr id="1" name=""/>
+        <p:cNvGrpSpPr/>
+        <p:nvPr/>
+      </p:nvGrpSpPr>
+      <p:grpSpPr>
+        <a:xfrm>
+          <a:off x="0" y="0"/>
+          <a:ext cx="0" cy="0"/>
+          <a:chOff x="0" y="0"/>
+          <a:chExt cx="0" cy="0"/>
+        </a:xfrm>
+      </p:grpSpPr>
+      <p:sp>
+        <p:nvSpPr>
+          <p:cNvPr id="2" name="文本框 1">
+            <a:extLst>
+              <a:ext uri="{FF2B5EF4-FFF2-40B4-BE49-F238E27FC236}">
+                <a16:creationId xmlns:a16="http://schemas.microsoft.com/office/drawing/2014/main" id="{278C3AE2-9179-F8F6-A05F-BA0FF896F3BA}"/>
+              </a:ext>
+            </a:extLst>
+          </p:cNvPr>
+          <p:cNvSpPr txBox="1"/>
+          <p:nvPr/>
+        </p:nvSpPr>
+        <p:spPr>
+          <a:xfrm>
+            <a:off x="284909" y="188233"/>
+            <a:ext cx="6462402" cy="584775"/>
+          </a:xfrm>
+          <a:prstGeom prst="rect">
+            <a:avLst/>
+          </a:prstGeom>
+          <a:noFill/>
+        </p:spPr>
+        <p:txBody>
+          <a:bodyPr wrap="square" rtlCol="0">
+            <a:spAutoFit/>
+          </a:bodyPr>
+          <a:lstStyle/>
+          <a:p>
+            <a:r>
+              <a:rPr lang="en-US" altLang="zh-CN" sz="3200" dirty="0">
+                <a:latin typeface="Times New Roman" panose="02020603050405020304" pitchFamily="18" charset="0"/>
+                <a:cs typeface="Times New Roman" panose="02020603050405020304" pitchFamily="18" charset="0"/>
+              </a:rPr>
+              <a:t>Step3: </a:t>
+            </a:r>
+            <a:r>
+              <a:rPr lang="zh-CN" altLang="en-US" sz="3200" dirty="0">
+                <a:latin typeface="Times New Roman" panose="02020603050405020304" pitchFamily="18" charset="0"/>
+                <a:cs typeface="Times New Roman" panose="02020603050405020304" pitchFamily="18" charset="0"/>
+              </a:rPr>
+              <a:t>获取关节速度</a:t>
+            </a:r>
+          </a:p>
+        </p:txBody>
+      </p:sp>
+      <p:pic>
+        <p:nvPicPr>
+          <p:cNvPr id="3" name="图片 2">
+            <a:extLst>
+              <a:ext uri="{FF2B5EF4-FFF2-40B4-BE49-F238E27FC236}">
+                <a16:creationId xmlns:a16="http://schemas.microsoft.com/office/drawing/2014/main" id="{F45ED90A-A683-100E-C487-ED697AF5E117}"/>
+              </a:ext>
+            </a:extLst>
+          </p:cNvPr>
+          <p:cNvPicPr>
+            <a:picLocks noChangeAspect="1"/>
+          </p:cNvPicPr>
+          <p:nvPr/>
+        </p:nvPicPr>
+        <p:blipFill>
+          <a:blip r:embed="rId2"/>
+          <a:stretch>
+            <a:fillRect/>
+          </a:stretch>
+        </p:blipFill>
+        <p:spPr>
+          <a:xfrm>
+            <a:off x="2361565" y="654301"/>
+            <a:ext cx="3714750" cy="1476375"/>
+          </a:xfrm>
+          <a:prstGeom prst="rect">
+            <a:avLst/>
+          </a:prstGeom>
+        </p:spPr>
+      </p:pic>
+      <p:pic>
+        <p:nvPicPr>
+          <p:cNvPr id="7" name="图片 6">
+            <a:extLst>
+              <a:ext uri="{FF2B5EF4-FFF2-40B4-BE49-F238E27FC236}">
+                <a16:creationId xmlns:a16="http://schemas.microsoft.com/office/drawing/2014/main" id="{110EBEAE-0047-3504-6E04-1E0EAC383744}"/>
+              </a:ext>
+            </a:extLst>
+          </p:cNvPr>
+          <p:cNvPicPr>
+            <a:picLocks noChangeAspect="1"/>
+          </p:cNvPicPr>
+          <p:nvPr/>
+        </p:nvPicPr>
+        <p:blipFill>
+          <a:blip r:embed="rId3"/>
+          <a:stretch>
+            <a:fillRect/>
+          </a:stretch>
+        </p:blipFill>
+        <p:spPr>
+          <a:xfrm>
+            <a:off x="189497" y="3018021"/>
+            <a:ext cx="11620500" cy="3752850"/>
+          </a:xfrm>
+          <a:prstGeom prst="rect">
+            <a:avLst/>
+          </a:prstGeom>
+        </p:spPr>
+      </p:pic>
+      <p:cxnSp>
+        <p:nvCxnSpPr>
+          <p:cNvPr id="9" name="直接箭头连接符 8">
+            <a:extLst>
+              <a:ext uri="{FF2B5EF4-FFF2-40B4-BE49-F238E27FC236}">
+                <a16:creationId xmlns:a16="http://schemas.microsoft.com/office/drawing/2014/main" id="{3517B1B3-1B18-D8CE-B544-59C07DD61C5D}"/>
+              </a:ext>
+            </a:extLst>
+          </p:cNvPr>
+          <p:cNvCxnSpPr/>
+          <p:nvPr/>
+        </p:nvCxnSpPr>
+        <p:spPr>
+          <a:xfrm>
+            <a:off x="5861785" y="2189637"/>
+            <a:ext cx="0" cy="678691"/>
+          </a:xfrm>
+          <a:prstGeom prst="straightConnector1">
+            <a:avLst/>
+          </a:prstGeom>
+          <a:ln w="28575">
+            <a:tailEnd type="triangle"/>
+          </a:ln>
+        </p:spPr>
+        <p:style>
+          <a:lnRef idx="1">
+            <a:schemeClr val="accent1"/>
+          </a:lnRef>
+          <a:fillRef idx="0">
+            <a:schemeClr val="accent1"/>
+          </a:fillRef>
+          <a:effectRef idx="0">
+            <a:schemeClr val="accent1"/>
+          </a:effectRef>
+          <a:fontRef idx="minor">
+            <a:schemeClr val="tx1"/>
+          </a:fontRef>
+        </p:style>
+      </p:cxnSp>
+      <p:pic>
+        <p:nvPicPr>
+          <p:cNvPr id="10" name="图片 9">
+            <a:extLst>
+              <a:ext uri="{FF2B5EF4-FFF2-40B4-BE49-F238E27FC236}">
+                <a16:creationId xmlns:a16="http://schemas.microsoft.com/office/drawing/2014/main" id="{2FDBB301-2077-06B0-86FE-EDB2A5422C12}"/>
+              </a:ext>
+            </a:extLst>
+          </p:cNvPr>
+          <p:cNvPicPr>
+            <a:picLocks noChangeAspect="1"/>
+          </p:cNvPicPr>
+          <p:nvPr/>
+        </p:nvPicPr>
+        <p:blipFill rotWithShape="1">
+          <a:blip r:embed="rId4"/>
+          <a:srcRect r="14373" b="27519"/>
+          <a:stretch/>
+        </p:blipFill>
+        <p:spPr>
+          <a:xfrm>
+            <a:off x="5999747" y="2302488"/>
+            <a:ext cx="1345733" cy="386615"/>
+          </a:xfrm>
+          <a:prstGeom prst="rect">
+            <a:avLst/>
+          </a:prstGeom>
+        </p:spPr>
+      </p:pic>
+      <p:pic>
+        <p:nvPicPr>
+          <p:cNvPr id="11" name="图片 10">
+            <a:extLst>
+              <a:ext uri="{FF2B5EF4-FFF2-40B4-BE49-F238E27FC236}">
+                <a16:creationId xmlns:a16="http://schemas.microsoft.com/office/drawing/2014/main" id="{AC3DB554-A527-5455-4D5C-0E8FB3E0AC62}"/>
+              </a:ext>
+            </a:extLst>
+          </p:cNvPr>
+          <p:cNvPicPr>
+            <a:picLocks noChangeAspect="1"/>
+          </p:cNvPicPr>
+          <p:nvPr/>
+        </p:nvPicPr>
+        <p:blipFill>
+          <a:blip r:embed="rId5"/>
+          <a:stretch>
+            <a:fillRect/>
+          </a:stretch>
+        </p:blipFill>
+        <p:spPr>
+          <a:xfrm>
+            <a:off x="6309359" y="601232"/>
+            <a:ext cx="4896691" cy="1415816"/>
+          </a:xfrm>
+          <a:prstGeom prst="rect">
+            <a:avLst/>
+          </a:prstGeom>
+        </p:spPr>
+      </p:pic>
+    </p:spTree>
+    <p:extLst>
+      <p:ext uri="{BB962C8B-B14F-4D97-AF65-F5344CB8AC3E}">
+        <p14:creationId xmlns:p14="http://schemas.microsoft.com/office/powerpoint/2010/main" val="527029476"/>
       </p:ext>
     </p:extLst>
   </p:cSld>
@@ -4164,6 +5811,707 @@
       </p:grpSpPr>
       <p:pic>
         <p:nvPicPr>
+          <p:cNvPr id="4" name="图片 3">
+            <a:extLst>
+              <a:ext uri="{FF2B5EF4-FFF2-40B4-BE49-F238E27FC236}">
+                <a16:creationId xmlns:a16="http://schemas.microsoft.com/office/drawing/2014/main" id="{78221E10-0922-282E-5047-0E3C0565B07E}"/>
+              </a:ext>
+            </a:extLst>
+          </p:cNvPr>
+          <p:cNvPicPr>
+            <a:picLocks noChangeAspect="1"/>
+          </p:cNvPicPr>
+          <p:nvPr/>
+        </p:nvPicPr>
+        <p:blipFill>
+          <a:blip r:embed="rId2"/>
+          <a:stretch>
+            <a:fillRect/>
+          </a:stretch>
+        </p:blipFill>
+        <p:spPr>
+          <a:xfrm>
+            <a:off x="253467" y="0"/>
+            <a:ext cx="11685065" cy="6858000"/>
+          </a:xfrm>
+          <a:prstGeom prst="rect">
+            <a:avLst/>
+          </a:prstGeom>
+        </p:spPr>
+      </p:pic>
+      <p:sp>
+        <p:nvSpPr>
+          <p:cNvPr id="5" name="矩形: 圆角 4">
+            <a:extLst>
+              <a:ext uri="{FF2B5EF4-FFF2-40B4-BE49-F238E27FC236}">
+                <a16:creationId xmlns:a16="http://schemas.microsoft.com/office/drawing/2014/main" id="{A1366CC3-1616-C8CF-7E8D-5B8064C607B4}"/>
+              </a:ext>
+            </a:extLst>
+          </p:cNvPr>
+          <p:cNvSpPr/>
+          <p:nvPr/>
+        </p:nvSpPr>
+        <p:spPr>
+          <a:xfrm>
+            <a:off x="895149" y="5428648"/>
+            <a:ext cx="1270535" cy="298384"/>
+          </a:xfrm>
+          <a:prstGeom prst="roundRect">
+            <a:avLst/>
+          </a:prstGeom>
+          <a:noFill/>
+          <a:ln w="28575">
+            <a:solidFill>
+              <a:schemeClr val="accent2">
+                <a:lumMod val="75000"/>
+              </a:schemeClr>
+            </a:solidFill>
+          </a:ln>
+        </p:spPr>
+        <p:style>
+          <a:lnRef idx="2">
+            <a:schemeClr val="accent1">
+              <a:shade val="50000"/>
+            </a:schemeClr>
+          </a:lnRef>
+          <a:fillRef idx="1">
+            <a:schemeClr val="accent1"/>
+          </a:fillRef>
+          <a:effectRef idx="0">
+            <a:schemeClr val="accent1"/>
+          </a:effectRef>
+          <a:fontRef idx="minor">
+            <a:schemeClr val="lt1"/>
+          </a:fontRef>
+        </p:style>
+        <p:txBody>
+          <a:bodyPr rtlCol="0" anchor="ctr"/>
+          <a:lstStyle/>
+          <a:p>
+            <a:pPr algn="ctr"/>
+            <a:endParaRPr lang="zh-CN" altLang="en-US"/>
+          </a:p>
+        </p:txBody>
+      </p:sp>
+    </p:spTree>
+    <p:extLst>
+      <p:ext uri="{BB962C8B-B14F-4D97-AF65-F5344CB8AC3E}">
+        <p14:creationId xmlns:p14="http://schemas.microsoft.com/office/powerpoint/2010/main" val="1305158503"/>
+      </p:ext>
+    </p:extLst>
+  </p:cSld>
+  <p:clrMapOvr>
+    <a:masterClrMapping/>
+  </p:clrMapOvr>
+  <p:timing>
+    <p:tnLst>
+      <p:par>
+        <p:cTn id="1" dur="indefinite" restart="never" nodeType="tmRoot">
+          <p:childTnLst>
+            <p:seq concurrent="1" nextAc="seek">
+              <p:cTn id="2" dur="indefinite" nodeType="mainSeq">
+                <p:childTnLst>
+                  <p:par>
+                    <p:cTn id="3" fill="hold">
+                      <p:stCondLst>
+                        <p:cond delay="indefinite"/>
+                      </p:stCondLst>
+                      <p:childTnLst>
+                        <p:par>
+                          <p:cTn id="4" fill="hold">
+                            <p:stCondLst>
+                              <p:cond delay="0"/>
+                            </p:stCondLst>
+                            <p:childTnLst>
+                              <p:par>
+                                <p:cTn id="5" presetID="10" presetClass="entr" presetSubtype="0" fill="hold" grpId="0" nodeType="clickEffect">
+                                  <p:stCondLst>
+                                    <p:cond delay="0"/>
+                                  </p:stCondLst>
+                                  <p:childTnLst>
+                                    <p:set>
+                                      <p:cBhvr>
+                                        <p:cTn id="6" dur="1" fill="hold">
+                                          <p:stCondLst>
+                                            <p:cond delay="0"/>
+                                          </p:stCondLst>
+                                        </p:cTn>
+                                        <p:tgtEl>
+                                          <p:spTgt spid="5"/>
+                                        </p:tgtEl>
+                                        <p:attrNameLst>
+                                          <p:attrName>style.visibility</p:attrName>
+                                        </p:attrNameLst>
+                                      </p:cBhvr>
+                                      <p:to>
+                                        <p:strVal val="visible"/>
+                                      </p:to>
+                                    </p:set>
+                                    <p:animEffect transition="in" filter="fade">
+                                      <p:cBhvr>
+                                        <p:cTn id="7" dur="500"/>
+                                        <p:tgtEl>
+                                          <p:spTgt spid="5"/>
+                                        </p:tgtEl>
+                                      </p:cBhvr>
+                                    </p:animEffect>
+                                  </p:childTnLst>
+                                </p:cTn>
+                              </p:par>
+                            </p:childTnLst>
+                          </p:cTn>
+                        </p:par>
+                      </p:childTnLst>
+                    </p:cTn>
+                  </p:par>
+                </p:childTnLst>
+              </p:cTn>
+              <p:prevCondLst>
+                <p:cond evt="onPrev" delay="0">
+                  <p:tgtEl>
+                    <p:sldTgt/>
+                  </p:tgtEl>
+                </p:cond>
+              </p:prevCondLst>
+              <p:nextCondLst>
+                <p:cond evt="onNext" delay="0">
+                  <p:tgtEl>
+                    <p:sldTgt/>
+                  </p:tgtEl>
+                </p:cond>
+              </p:nextCondLst>
+            </p:seq>
+          </p:childTnLst>
+        </p:cTn>
+      </p:par>
+    </p:tnLst>
+    <p:bldLst>
+      <p:bldP spid="5" grpId="0" animBg="1"/>
+    </p:bldLst>
+  </p:timing>
+</p:sld>
+</file>
+
+<file path=ppt/slides/slide20.xml><?xml version="1.0" encoding="utf-8"?>
+<p:sld xmlns:a="http://schemas.openxmlformats.org/drawingml/2006/main" xmlns:r="http://schemas.openxmlformats.org/officeDocument/2006/relationships" xmlns:p="http://schemas.openxmlformats.org/presentationml/2006/main">
+  <p:cSld>
+    <p:spTree>
+      <p:nvGrpSpPr>
+        <p:cNvPr id="1" name=""/>
+        <p:cNvGrpSpPr/>
+        <p:nvPr/>
+      </p:nvGrpSpPr>
+      <p:grpSpPr>
+        <a:xfrm>
+          <a:off x="0" y="0"/>
+          <a:ext cx="0" cy="0"/>
+          <a:chOff x="0" y="0"/>
+          <a:chExt cx="0" cy="0"/>
+        </a:xfrm>
+      </p:grpSpPr>
+      <p:sp>
+        <p:nvSpPr>
+          <p:cNvPr id="2" name="文本框 1">
+            <a:extLst>
+              <a:ext uri="{FF2B5EF4-FFF2-40B4-BE49-F238E27FC236}">
+                <a16:creationId xmlns:a16="http://schemas.microsoft.com/office/drawing/2014/main" id="{278C3AE2-9179-F8F6-A05F-BA0FF896F3BA}"/>
+              </a:ext>
+            </a:extLst>
+          </p:cNvPr>
+          <p:cNvSpPr txBox="1"/>
+          <p:nvPr/>
+        </p:nvSpPr>
+        <p:spPr>
+          <a:xfrm>
+            <a:off x="284909" y="188233"/>
+            <a:ext cx="9426982" cy="1077218"/>
+          </a:xfrm>
+          <a:prstGeom prst="rect">
+            <a:avLst/>
+          </a:prstGeom>
+          <a:noFill/>
+        </p:spPr>
+        <p:txBody>
+          <a:bodyPr wrap="square" rtlCol="0">
+            <a:spAutoFit/>
+          </a:bodyPr>
+          <a:lstStyle/>
+          <a:p>
+            <a:r>
+              <a:rPr lang="en-US" altLang="zh-CN" sz="3200" dirty="0">
+                <a:latin typeface="Times New Roman" panose="02020603050405020304" pitchFamily="18" charset="0"/>
+                <a:cs typeface="Times New Roman" panose="02020603050405020304" pitchFamily="18" charset="0"/>
+              </a:rPr>
+              <a:t>Step4: </a:t>
+            </a:r>
+            <a:r>
+              <a:rPr lang="zh-CN" altLang="en-US" sz="3200" dirty="0">
+                <a:latin typeface="Times New Roman" panose="02020603050405020304" pitchFamily="18" charset="0"/>
+                <a:cs typeface="Times New Roman" panose="02020603050405020304" pitchFamily="18" charset="0"/>
+              </a:rPr>
+              <a:t>界面包装 </a:t>
+            </a:r>
+            <a:r>
+              <a:rPr lang="en-US" altLang="zh-CN" sz="3200" dirty="0">
+                <a:latin typeface="Times New Roman" panose="02020603050405020304" pitchFamily="18" charset="0"/>
+                <a:cs typeface="Times New Roman" panose="02020603050405020304" pitchFamily="18" charset="0"/>
+              </a:rPr>
+              <a:t>—— Create Subsystem</a:t>
+            </a:r>
+            <a:endParaRPr lang="zh-CN" altLang="en-US" sz="3200" dirty="0">
+              <a:latin typeface="Times New Roman" panose="02020603050405020304" pitchFamily="18" charset="0"/>
+              <a:cs typeface="Times New Roman" panose="02020603050405020304" pitchFamily="18" charset="0"/>
+            </a:endParaRPr>
+          </a:p>
+          <a:p>
+            <a:endParaRPr lang="zh-CN" altLang="en-US" sz="3200" dirty="0">
+              <a:latin typeface="Times New Roman" panose="02020603050405020304" pitchFamily="18" charset="0"/>
+              <a:cs typeface="Times New Roman" panose="02020603050405020304" pitchFamily="18" charset="0"/>
+            </a:endParaRPr>
+          </a:p>
+        </p:txBody>
+      </p:sp>
+      <p:pic>
+        <p:nvPicPr>
+          <p:cNvPr id="14" name="图片 13">
+            <a:extLst>
+              <a:ext uri="{FF2B5EF4-FFF2-40B4-BE49-F238E27FC236}">
+                <a16:creationId xmlns:a16="http://schemas.microsoft.com/office/drawing/2014/main" id="{C1DB1CEB-EBBE-3654-B6F0-41CB09690BC5}"/>
+              </a:ext>
+            </a:extLst>
+          </p:cNvPr>
+          <p:cNvPicPr>
+            <a:picLocks noChangeAspect="1"/>
+          </p:cNvPicPr>
+          <p:nvPr/>
+        </p:nvPicPr>
+        <p:blipFill>
+          <a:blip r:embed="rId2"/>
+          <a:stretch>
+            <a:fillRect/>
+          </a:stretch>
+        </p:blipFill>
+        <p:spPr>
+          <a:xfrm>
+            <a:off x="2620919" y="2059806"/>
+            <a:ext cx="7855377" cy="3561548"/>
+          </a:xfrm>
+          <a:prstGeom prst="rect">
+            <a:avLst/>
+          </a:prstGeom>
+        </p:spPr>
+      </p:pic>
+    </p:spTree>
+    <p:extLst>
+      <p:ext uri="{BB962C8B-B14F-4D97-AF65-F5344CB8AC3E}">
+        <p14:creationId xmlns:p14="http://schemas.microsoft.com/office/powerpoint/2010/main" val="2970960876"/>
+      </p:ext>
+    </p:extLst>
+  </p:cSld>
+  <p:clrMapOvr>
+    <a:masterClrMapping/>
+  </p:clrMapOvr>
+</p:sld>
+</file>
+
+<file path=ppt/slides/slide21.xml><?xml version="1.0" encoding="utf-8"?>
+<p:sld xmlns:a="http://schemas.openxmlformats.org/drawingml/2006/main" xmlns:r="http://schemas.openxmlformats.org/officeDocument/2006/relationships" xmlns:p="http://schemas.openxmlformats.org/presentationml/2006/main">
+  <p:cSld>
+    <p:spTree>
+      <p:nvGrpSpPr>
+        <p:cNvPr id="1" name=""/>
+        <p:cNvGrpSpPr/>
+        <p:nvPr/>
+      </p:nvGrpSpPr>
+      <p:grpSpPr>
+        <a:xfrm>
+          <a:off x="0" y="0"/>
+          <a:ext cx="0" cy="0"/>
+          <a:chOff x="0" y="0"/>
+          <a:chExt cx="0" cy="0"/>
+        </a:xfrm>
+      </p:grpSpPr>
+      <p:sp>
+        <p:nvSpPr>
+          <p:cNvPr id="2" name="文本框 1">
+            <a:extLst>
+              <a:ext uri="{FF2B5EF4-FFF2-40B4-BE49-F238E27FC236}">
+                <a16:creationId xmlns:a16="http://schemas.microsoft.com/office/drawing/2014/main" id="{278C3AE2-9179-F8F6-A05F-BA0FF896F3BA}"/>
+              </a:ext>
+            </a:extLst>
+          </p:cNvPr>
+          <p:cNvSpPr txBox="1"/>
+          <p:nvPr/>
+        </p:nvSpPr>
+        <p:spPr>
+          <a:xfrm>
+            <a:off x="74500" y="151513"/>
+            <a:ext cx="6462402" cy="1077218"/>
+          </a:xfrm>
+          <a:prstGeom prst="rect">
+            <a:avLst/>
+          </a:prstGeom>
+          <a:noFill/>
+        </p:spPr>
+        <p:txBody>
+          <a:bodyPr wrap="square" rtlCol="0">
+            <a:spAutoFit/>
+          </a:bodyPr>
+          <a:lstStyle/>
+          <a:p>
+            <a:r>
+              <a:rPr lang="en-US" altLang="zh-CN" sz="3200" dirty="0">
+                <a:latin typeface="Times New Roman" panose="02020603050405020304" pitchFamily="18" charset="0"/>
+                <a:cs typeface="Times New Roman" panose="02020603050405020304" pitchFamily="18" charset="0"/>
+              </a:rPr>
+              <a:t>Step4: </a:t>
+            </a:r>
+            <a:r>
+              <a:rPr lang="zh-CN" altLang="en-US" sz="3200" dirty="0">
+                <a:latin typeface="Times New Roman" panose="02020603050405020304" pitchFamily="18" charset="0"/>
+                <a:cs typeface="Times New Roman" panose="02020603050405020304" pitchFamily="18" charset="0"/>
+              </a:rPr>
+              <a:t>界面包装 </a:t>
+            </a:r>
+            <a:r>
+              <a:rPr lang="en-US" altLang="zh-CN" sz="3200" dirty="0">
+                <a:latin typeface="Times New Roman" panose="02020603050405020304" pitchFamily="18" charset="0"/>
+                <a:cs typeface="Times New Roman" panose="02020603050405020304" pitchFamily="18" charset="0"/>
+              </a:rPr>
+              <a:t>——</a:t>
+            </a:r>
+            <a:r>
+              <a:rPr lang="zh-CN" altLang="en-US" sz="3200" dirty="0">
+                <a:latin typeface="Times New Roman" panose="02020603050405020304" pitchFamily="18" charset="0"/>
+                <a:cs typeface="Times New Roman" panose="02020603050405020304" pitchFamily="18" charset="0"/>
+              </a:rPr>
+              <a:t>设置 </a:t>
+            </a:r>
+            <a:r>
+              <a:rPr lang="en-US" altLang="zh-CN" sz="3200" dirty="0">
+                <a:latin typeface="Times New Roman" panose="02020603050405020304" pitchFamily="18" charset="0"/>
+                <a:cs typeface="Times New Roman" panose="02020603050405020304" pitchFamily="18" charset="0"/>
+              </a:rPr>
+              <a:t>Mask</a:t>
+            </a:r>
+            <a:endParaRPr lang="zh-CN" altLang="en-US" sz="3200" dirty="0">
+              <a:latin typeface="Times New Roman" panose="02020603050405020304" pitchFamily="18" charset="0"/>
+              <a:cs typeface="Times New Roman" panose="02020603050405020304" pitchFamily="18" charset="0"/>
+            </a:endParaRPr>
+          </a:p>
+          <a:p>
+            <a:endParaRPr lang="zh-CN" altLang="en-US" sz="3200" dirty="0">
+              <a:latin typeface="Times New Roman" panose="02020603050405020304" pitchFamily="18" charset="0"/>
+              <a:cs typeface="Times New Roman" panose="02020603050405020304" pitchFamily="18" charset="0"/>
+            </a:endParaRPr>
+          </a:p>
+        </p:txBody>
+      </p:sp>
+      <p:pic>
+        <p:nvPicPr>
+          <p:cNvPr id="4" name="图片 3">
+            <a:extLst>
+              <a:ext uri="{FF2B5EF4-FFF2-40B4-BE49-F238E27FC236}">
+                <a16:creationId xmlns:a16="http://schemas.microsoft.com/office/drawing/2014/main" id="{BA78D890-B9FE-2868-5AF3-3EAB97801CAC}"/>
+              </a:ext>
+            </a:extLst>
+          </p:cNvPr>
+          <p:cNvPicPr>
+            <a:picLocks noChangeAspect="1"/>
+          </p:cNvPicPr>
+          <p:nvPr/>
+        </p:nvPicPr>
+        <p:blipFill rotWithShape="1">
+          <a:blip r:embed="rId2"/>
+          <a:srcRect r="18636"/>
+          <a:stretch/>
+        </p:blipFill>
+        <p:spPr>
+          <a:xfrm>
+            <a:off x="6536902" y="1613368"/>
+            <a:ext cx="5515674" cy="2310502"/>
+          </a:xfrm>
+          <a:prstGeom prst="rect">
+            <a:avLst/>
+          </a:prstGeom>
+        </p:spPr>
+      </p:pic>
+      <p:sp>
+        <p:nvSpPr>
+          <p:cNvPr id="7" name="文本框 6">
+            <a:extLst>
+              <a:ext uri="{FF2B5EF4-FFF2-40B4-BE49-F238E27FC236}">
+                <a16:creationId xmlns:a16="http://schemas.microsoft.com/office/drawing/2014/main" id="{8BDE87AD-4023-B6BF-EA12-6F803365129D}"/>
+              </a:ext>
+            </a:extLst>
+          </p:cNvPr>
+          <p:cNvSpPr txBox="1"/>
+          <p:nvPr/>
+        </p:nvSpPr>
+        <p:spPr>
+          <a:xfrm>
+            <a:off x="270984" y="1120760"/>
+            <a:ext cx="6097604" cy="369332"/>
+          </a:xfrm>
+          <a:prstGeom prst="rect">
+            <a:avLst/>
+          </a:prstGeom>
+          <a:noFill/>
+        </p:spPr>
+        <p:txBody>
+          <a:bodyPr wrap="square">
+            <a:spAutoFit/>
+          </a:bodyPr>
+          <a:lstStyle/>
+          <a:p>
+            <a:pPr marL="285750" indent="-285750">
+              <a:buFont typeface="Wingdings" panose="05000000000000000000" pitchFamily="2" charset="2"/>
+              <a:buChar char="Ø"/>
+            </a:pPr>
+            <a:r>
+              <a:rPr lang="en-US" altLang="zh-CN" dirty="0">
+                <a:latin typeface="Times New Roman" panose="02020603050405020304" pitchFamily="18" charset="0"/>
+                <a:cs typeface="Times New Roman" panose="02020603050405020304" pitchFamily="18" charset="0"/>
+              </a:rPr>
+              <a:t>Ctrl + M </a:t>
+            </a:r>
+            <a:r>
+              <a:rPr lang="zh-CN" altLang="en-US" dirty="0">
+                <a:latin typeface="Times New Roman" panose="02020603050405020304" pitchFamily="18" charset="0"/>
+                <a:cs typeface="Times New Roman" panose="02020603050405020304" pitchFamily="18" charset="0"/>
+              </a:rPr>
+              <a:t>进入 </a:t>
+            </a:r>
+            <a:r>
+              <a:rPr lang="en-US" altLang="zh-CN" dirty="0">
+                <a:latin typeface="Times New Roman" panose="02020603050405020304" pitchFamily="18" charset="0"/>
+                <a:cs typeface="Times New Roman" panose="02020603050405020304" pitchFamily="18" charset="0"/>
+              </a:rPr>
+              <a:t>mask </a:t>
+            </a:r>
+            <a:r>
+              <a:rPr lang="zh-CN" altLang="en-US" dirty="0">
+                <a:latin typeface="Times New Roman" panose="02020603050405020304" pitchFamily="18" charset="0"/>
+                <a:cs typeface="Times New Roman" panose="02020603050405020304" pitchFamily="18" charset="0"/>
+              </a:rPr>
+              <a:t>设置页面</a:t>
+            </a:r>
+            <a:endParaRPr lang="zh-CN" altLang="en-US" dirty="0"/>
+          </a:p>
+        </p:txBody>
+      </p:sp>
+      <p:sp>
+        <p:nvSpPr>
+          <p:cNvPr id="8" name="文本框 7">
+            <a:extLst>
+              <a:ext uri="{FF2B5EF4-FFF2-40B4-BE49-F238E27FC236}">
+                <a16:creationId xmlns:a16="http://schemas.microsoft.com/office/drawing/2014/main" id="{6B35D1E2-CB30-1899-1601-2F7551B9D25C}"/>
+              </a:ext>
+            </a:extLst>
+          </p:cNvPr>
+          <p:cNvSpPr txBox="1"/>
+          <p:nvPr/>
+        </p:nvSpPr>
+        <p:spPr>
+          <a:xfrm>
+            <a:off x="6368588" y="1120760"/>
+            <a:ext cx="6097604" cy="369332"/>
+          </a:xfrm>
+          <a:prstGeom prst="rect">
+            <a:avLst/>
+          </a:prstGeom>
+          <a:noFill/>
+        </p:spPr>
+        <p:txBody>
+          <a:bodyPr wrap="square">
+            <a:spAutoFit/>
+          </a:bodyPr>
+          <a:lstStyle/>
+          <a:p>
+            <a:pPr marL="285750" indent="-285750">
+              <a:buFont typeface="Wingdings" panose="05000000000000000000" pitchFamily="2" charset="2"/>
+              <a:buChar char="Ø"/>
+            </a:pPr>
+            <a:r>
+              <a:rPr lang="zh-CN" altLang="en-US" dirty="0">
+                <a:latin typeface="Times New Roman" panose="02020603050405020304" pitchFamily="18" charset="0"/>
+                <a:cs typeface="Times New Roman" panose="02020603050405020304" pitchFamily="18" charset="0"/>
+              </a:rPr>
+              <a:t>设置变量</a:t>
+            </a:r>
+            <a:endParaRPr lang="zh-CN" altLang="en-US" dirty="0"/>
+          </a:p>
+        </p:txBody>
+      </p:sp>
+      <p:sp>
+        <p:nvSpPr>
+          <p:cNvPr id="9" name="文本框 8">
+            <a:extLst>
+              <a:ext uri="{FF2B5EF4-FFF2-40B4-BE49-F238E27FC236}">
+                <a16:creationId xmlns:a16="http://schemas.microsoft.com/office/drawing/2014/main" id="{C860BA6A-8E2F-9A27-907B-B59D30C7B972}"/>
+              </a:ext>
+            </a:extLst>
+          </p:cNvPr>
+          <p:cNvSpPr txBox="1"/>
+          <p:nvPr/>
+        </p:nvSpPr>
+        <p:spPr>
+          <a:xfrm>
+            <a:off x="270984" y="3391419"/>
+            <a:ext cx="6097604" cy="369332"/>
+          </a:xfrm>
+          <a:prstGeom prst="rect">
+            <a:avLst/>
+          </a:prstGeom>
+          <a:noFill/>
+        </p:spPr>
+        <p:txBody>
+          <a:bodyPr wrap="square">
+            <a:spAutoFit/>
+          </a:bodyPr>
+          <a:lstStyle/>
+          <a:p>
+            <a:pPr marL="285750" indent="-285750">
+              <a:buFont typeface="Wingdings" panose="05000000000000000000" pitchFamily="2" charset="2"/>
+              <a:buChar char="Ø"/>
+            </a:pPr>
+            <a:r>
+              <a:rPr lang="zh-CN" altLang="en-US" dirty="0">
+                <a:latin typeface="Times New Roman" panose="02020603050405020304" pitchFamily="18" charset="0"/>
+                <a:cs typeface="Times New Roman" panose="02020603050405020304" pitchFamily="18" charset="0"/>
+              </a:rPr>
+              <a:t>设置显示</a:t>
+            </a:r>
+            <a:endParaRPr lang="zh-CN" altLang="en-US" dirty="0"/>
+          </a:p>
+        </p:txBody>
+      </p:sp>
+      <p:pic>
+        <p:nvPicPr>
+          <p:cNvPr id="11" name="图片 10">
+            <a:extLst>
+              <a:ext uri="{FF2B5EF4-FFF2-40B4-BE49-F238E27FC236}">
+                <a16:creationId xmlns:a16="http://schemas.microsoft.com/office/drawing/2014/main" id="{9FD1341A-6433-D6BA-767D-CBFA40D33C7B}"/>
+              </a:ext>
+            </a:extLst>
+          </p:cNvPr>
+          <p:cNvPicPr>
+            <a:picLocks noChangeAspect="1"/>
+          </p:cNvPicPr>
+          <p:nvPr/>
+        </p:nvPicPr>
+        <p:blipFill>
+          <a:blip r:embed="rId3"/>
+          <a:stretch>
+            <a:fillRect/>
+          </a:stretch>
+        </p:blipFill>
+        <p:spPr>
+          <a:xfrm>
+            <a:off x="479365" y="3920244"/>
+            <a:ext cx="5290755" cy="2731555"/>
+          </a:xfrm>
+          <a:prstGeom prst="rect">
+            <a:avLst/>
+          </a:prstGeom>
+        </p:spPr>
+      </p:pic>
+      <p:pic>
+        <p:nvPicPr>
+          <p:cNvPr id="13" name="图片 12">
+            <a:extLst>
+              <a:ext uri="{FF2B5EF4-FFF2-40B4-BE49-F238E27FC236}">
+                <a16:creationId xmlns:a16="http://schemas.microsoft.com/office/drawing/2014/main" id="{408A6B05-EDB3-90F5-394E-C4F8A4332F04}"/>
+              </a:ext>
+            </a:extLst>
+          </p:cNvPr>
+          <p:cNvPicPr>
+            <a:picLocks noChangeAspect="1"/>
+          </p:cNvPicPr>
+          <p:nvPr/>
+        </p:nvPicPr>
+        <p:blipFill>
+          <a:blip r:embed="rId4"/>
+          <a:stretch>
+            <a:fillRect/>
+          </a:stretch>
+        </p:blipFill>
+        <p:spPr>
+          <a:xfrm>
+            <a:off x="310457" y="1685881"/>
+            <a:ext cx="2814286" cy="1411369"/>
+          </a:xfrm>
+          <a:prstGeom prst="rect">
+            <a:avLst/>
+          </a:prstGeom>
+        </p:spPr>
+      </p:pic>
+      <p:pic>
+        <p:nvPicPr>
+          <p:cNvPr id="10" name="图片 9">
+            <a:extLst>
+              <a:ext uri="{FF2B5EF4-FFF2-40B4-BE49-F238E27FC236}">
+                <a16:creationId xmlns:a16="http://schemas.microsoft.com/office/drawing/2014/main" id="{3D46E0F1-B111-3343-0D40-7CF05F6A33CC}"/>
+              </a:ext>
+            </a:extLst>
+          </p:cNvPr>
+          <p:cNvPicPr>
+            <a:picLocks noChangeAspect="1"/>
+          </p:cNvPicPr>
+          <p:nvPr/>
+        </p:nvPicPr>
+        <p:blipFill>
+          <a:blip r:embed="rId5"/>
+          <a:stretch>
+            <a:fillRect/>
+          </a:stretch>
+        </p:blipFill>
+        <p:spPr>
+          <a:xfrm>
+            <a:off x="2840161" y="1716923"/>
+            <a:ext cx="2984363" cy="1380327"/>
+          </a:xfrm>
+          <a:prstGeom prst="rect">
+            <a:avLst/>
+          </a:prstGeom>
+          <a:ln>
+            <a:noFill/>
+          </a:ln>
+          <a:effectLst/>
+        </p:spPr>
+      </p:pic>
+    </p:spTree>
+    <p:extLst>
+      <p:ext uri="{BB962C8B-B14F-4D97-AF65-F5344CB8AC3E}">
+        <p14:creationId xmlns:p14="http://schemas.microsoft.com/office/powerpoint/2010/main" val="3677675599"/>
+      </p:ext>
+    </p:extLst>
+  </p:cSld>
+  <p:clrMapOvr>
+    <a:masterClrMapping/>
+  </p:clrMapOvr>
+</p:sld>
+</file>
+
+<file path=ppt/slides/slide3.xml><?xml version="1.0" encoding="utf-8"?>
+<p:sld xmlns:a="http://schemas.openxmlformats.org/drawingml/2006/main" xmlns:r="http://schemas.openxmlformats.org/officeDocument/2006/relationships" xmlns:p="http://schemas.openxmlformats.org/presentationml/2006/main">
+  <p:cSld>
+    <p:spTree>
+      <p:nvGrpSpPr>
+        <p:cNvPr id="1" name=""/>
+        <p:cNvGrpSpPr/>
+        <p:nvPr/>
+      </p:nvGrpSpPr>
+      <p:grpSpPr>
+        <a:xfrm>
+          <a:off x="0" y="0"/>
+          <a:ext cx="0" cy="0"/>
+          <a:chOff x="0" y="0"/>
+          <a:chExt cx="0" cy="0"/>
+        </a:xfrm>
+      </p:grpSpPr>
+      <p:pic>
+        <p:nvPicPr>
           <p:cNvPr id="3" name="图片 2">
             <a:extLst>
               <a:ext uri="{FF2B5EF4-FFF2-40B4-BE49-F238E27FC236}">
@@ -4205,7 +6553,7 @@
 </p:sld>
 </file>
 
-<file path=ppt/slides/slide3.xml><?xml version="1.0" encoding="utf-8"?>
+<file path=ppt/slides/slide4.xml><?xml version="1.0" encoding="utf-8"?>
 <p:sld xmlns:a="http://schemas.openxmlformats.org/drawingml/2006/main" xmlns:r="http://schemas.openxmlformats.org/officeDocument/2006/relationships" xmlns:p="http://schemas.openxmlformats.org/presentationml/2006/main">
   <p:cSld>
     <p:spTree>
@@ -4651,7 +6999,7 @@
 </p:sld>
 </file>
 
-<file path=ppt/slides/slide4.xml><?xml version="1.0" encoding="utf-8"?>
+<file path=ppt/slides/slide5.xml><?xml version="1.0" encoding="utf-8"?>
 <p:sld xmlns:a="http://schemas.openxmlformats.org/drawingml/2006/main" xmlns:r="http://schemas.openxmlformats.org/officeDocument/2006/relationships" xmlns:p="http://schemas.openxmlformats.org/presentationml/2006/main">
   <p:cSld>
     <p:spTree>
@@ -4851,7 +7199,7 @@
 </p:sld>
 </file>
 
-<file path=ppt/slides/slide5.xml><?xml version="1.0" encoding="utf-8"?>
+<file path=ppt/slides/slide6.xml><?xml version="1.0" encoding="utf-8"?>
 <p:sld xmlns:a="http://schemas.openxmlformats.org/drawingml/2006/main" xmlns:r="http://schemas.openxmlformats.org/officeDocument/2006/relationships" xmlns:p="http://schemas.openxmlformats.org/presentationml/2006/main">
   <p:cSld>
     <p:spTree>
@@ -5189,7 +7537,7 @@
 </p:sld>
 </file>
 
-<file path=ppt/slides/slide6.xml><?xml version="1.0" encoding="utf-8"?>
+<file path=ppt/slides/slide7.xml><?xml version="1.0" encoding="utf-8"?>
 <p:sld xmlns:a="http://schemas.openxmlformats.org/drawingml/2006/main" xmlns:r="http://schemas.openxmlformats.org/officeDocument/2006/relationships" xmlns:p="http://schemas.openxmlformats.org/presentationml/2006/main">
   <p:cSld>
     <p:spTree>
@@ -5670,7 +8018,7 @@
 </p:sld>
 </file>
 
-<file path=ppt/slides/slide7.xml><?xml version="1.0" encoding="utf-8"?>
+<file path=ppt/slides/slide8.xml><?xml version="1.0" encoding="utf-8"?>
 <p:sld xmlns:a="http://schemas.openxmlformats.org/drawingml/2006/main" xmlns:r="http://schemas.openxmlformats.org/officeDocument/2006/relationships" xmlns:p="http://schemas.openxmlformats.org/presentationml/2006/main">
   <p:cSld>
     <p:spTree>
@@ -6224,7 +8572,7 @@
 </p:sld>
 </file>
 
-<file path=ppt/slides/slide8.xml><?xml version="1.0" encoding="utf-8"?>
+<file path=ppt/slides/slide9.xml><?xml version="1.0" encoding="utf-8"?>
 <p:sld xmlns:a="http://schemas.openxmlformats.org/drawingml/2006/main" xmlns:r="http://schemas.openxmlformats.org/officeDocument/2006/relationships" xmlns:p="http://schemas.openxmlformats.org/presentationml/2006/main">
   <p:cSld>
     <p:spTree>
@@ -6335,274 +8683,6 @@
   <p:clrMapOvr>
     <a:masterClrMapping/>
   </p:clrMapOvr>
-</p:sld>
-</file>
-
-<file path=ppt/slides/slide9.xml><?xml version="1.0" encoding="utf-8"?>
-<p:sld xmlns:a="http://schemas.openxmlformats.org/drawingml/2006/main" xmlns:r="http://schemas.openxmlformats.org/officeDocument/2006/relationships" xmlns:p="http://schemas.openxmlformats.org/presentationml/2006/main">
-  <p:cSld>
-    <p:spTree>
-      <p:nvGrpSpPr>
-        <p:cNvPr id="1" name=""/>
-        <p:cNvGrpSpPr/>
-        <p:nvPr/>
-      </p:nvGrpSpPr>
-      <p:grpSpPr>
-        <a:xfrm>
-          <a:off x="0" y="0"/>
-          <a:ext cx="0" cy="0"/>
-          <a:chOff x="0" y="0"/>
-          <a:chExt cx="0" cy="0"/>
-        </a:xfrm>
-      </p:grpSpPr>
-      <p:pic>
-        <p:nvPicPr>
-          <p:cNvPr id="4" name="图片 3">
-            <a:extLst>
-              <a:ext uri="{FF2B5EF4-FFF2-40B4-BE49-F238E27FC236}">
-                <a16:creationId xmlns:a16="http://schemas.microsoft.com/office/drawing/2014/main" id="{90C024AE-F24B-2F4F-E354-04542C52A04E}"/>
-              </a:ext>
-            </a:extLst>
-          </p:cNvPr>
-          <p:cNvPicPr>
-            <a:picLocks noChangeAspect="1"/>
-          </p:cNvPicPr>
-          <p:nvPr/>
-        </p:nvPicPr>
-        <p:blipFill>
-          <a:blip r:embed="rId2"/>
-          <a:stretch>
-            <a:fillRect/>
-          </a:stretch>
-        </p:blipFill>
-        <p:spPr>
-          <a:xfrm>
-            <a:off x="0" y="0"/>
-            <a:ext cx="6311920" cy="3429000"/>
-          </a:xfrm>
-          <a:prstGeom prst="rect">
-            <a:avLst/>
-          </a:prstGeom>
-        </p:spPr>
-      </p:pic>
-      <p:pic>
-        <p:nvPicPr>
-          <p:cNvPr id="3" name="图片 2">
-            <a:extLst>
-              <a:ext uri="{FF2B5EF4-FFF2-40B4-BE49-F238E27FC236}">
-                <a16:creationId xmlns:a16="http://schemas.microsoft.com/office/drawing/2014/main" id="{8649F0B6-1C5D-0C85-9C5D-BA7C08658856}"/>
-              </a:ext>
-            </a:extLst>
-          </p:cNvPr>
-          <p:cNvPicPr>
-            <a:picLocks noChangeAspect="1"/>
-          </p:cNvPicPr>
-          <p:nvPr/>
-        </p:nvPicPr>
-        <p:blipFill rotWithShape="1">
-          <a:blip r:embed="rId3"/>
-          <a:srcRect l="8100" t="22877"/>
-          <a:stretch/>
-        </p:blipFill>
-        <p:spPr>
-          <a:xfrm>
-            <a:off x="4360244" y="3003082"/>
-            <a:ext cx="7539965" cy="3854918"/>
-          </a:xfrm>
-          <a:prstGeom prst="rect">
-            <a:avLst/>
-          </a:prstGeom>
-        </p:spPr>
-      </p:pic>
-      <p:sp>
-        <p:nvSpPr>
-          <p:cNvPr id="5" name="矩形: 圆角 4">
-            <a:extLst>
-              <a:ext uri="{FF2B5EF4-FFF2-40B4-BE49-F238E27FC236}">
-                <a16:creationId xmlns:a16="http://schemas.microsoft.com/office/drawing/2014/main" id="{41FF02CD-5A6B-DDBA-D966-8C0EFBABA9F3}"/>
-              </a:ext>
-            </a:extLst>
-          </p:cNvPr>
-          <p:cNvSpPr/>
-          <p:nvPr/>
-        </p:nvSpPr>
-        <p:spPr>
-          <a:xfrm>
-            <a:off x="8598570" y="3621505"/>
-            <a:ext cx="1344327" cy="796491"/>
-          </a:xfrm>
-          <a:prstGeom prst="roundRect">
-            <a:avLst/>
-          </a:prstGeom>
-          <a:noFill/>
-          <a:ln w="28575">
-            <a:solidFill>
-              <a:schemeClr val="accent2">
-                <a:lumMod val="75000"/>
-              </a:schemeClr>
-            </a:solidFill>
-          </a:ln>
-        </p:spPr>
-        <p:style>
-          <a:lnRef idx="2">
-            <a:schemeClr val="accent1">
-              <a:shade val="50000"/>
-            </a:schemeClr>
-          </a:lnRef>
-          <a:fillRef idx="1">
-            <a:schemeClr val="accent1"/>
-          </a:fillRef>
-          <a:effectRef idx="0">
-            <a:schemeClr val="accent1"/>
-          </a:effectRef>
-          <a:fontRef idx="minor">
-            <a:schemeClr val="lt1"/>
-          </a:fontRef>
-        </p:style>
-        <p:txBody>
-          <a:bodyPr rtlCol="0" anchor="ctr"/>
-          <a:lstStyle/>
-          <a:p>
-            <a:pPr algn="ctr"/>
-            <a:endParaRPr lang="zh-CN" altLang="en-US"/>
-          </a:p>
-        </p:txBody>
-      </p:sp>
-      <p:cxnSp>
-        <p:nvCxnSpPr>
-          <p:cNvPr id="8" name="直接箭头连接符 7">
-            <a:extLst>
-              <a:ext uri="{FF2B5EF4-FFF2-40B4-BE49-F238E27FC236}">
-                <a16:creationId xmlns:a16="http://schemas.microsoft.com/office/drawing/2014/main" id="{B4914EA9-0987-7D46-263D-D623B93F95CE}"/>
-              </a:ext>
-            </a:extLst>
-          </p:cNvPr>
-          <p:cNvCxnSpPr/>
-          <p:nvPr/>
-        </p:nvCxnSpPr>
-        <p:spPr>
-          <a:xfrm flipH="1" flipV="1">
-            <a:off x="3724977" y="2762451"/>
-            <a:ext cx="4889634" cy="914400"/>
-          </a:xfrm>
-          <a:prstGeom prst="straightConnector1">
-            <a:avLst/>
-          </a:prstGeom>
-          <a:ln w="28575">
-            <a:tailEnd type="triangle"/>
-          </a:ln>
-        </p:spPr>
-        <p:style>
-          <a:lnRef idx="1">
-            <a:schemeClr val="accent2"/>
-          </a:lnRef>
-          <a:fillRef idx="0">
-            <a:schemeClr val="accent2"/>
-          </a:fillRef>
-          <a:effectRef idx="0">
-            <a:schemeClr val="accent2"/>
-          </a:effectRef>
-          <a:fontRef idx="minor">
-            <a:schemeClr val="tx1"/>
-          </a:fontRef>
-        </p:style>
-      </p:cxnSp>
-    </p:spTree>
-    <p:extLst>
-      <p:ext uri="{BB962C8B-B14F-4D97-AF65-F5344CB8AC3E}">
-        <p14:creationId xmlns:p14="http://schemas.microsoft.com/office/powerpoint/2010/main" val="262489796"/>
-      </p:ext>
-    </p:extLst>
-  </p:cSld>
-  <p:clrMapOvr>
-    <a:masterClrMapping/>
-  </p:clrMapOvr>
-  <p:timing>
-    <p:tnLst>
-      <p:par>
-        <p:cTn id="1" dur="indefinite" restart="never" nodeType="tmRoot">
-          <p:childTnLst>
-            <p:seq concurrent="1" nextAc="seek">
-              <p:cTn id="2" dur="indefinite" nodeType="mainSeq">
-                <p:childTnLst>
-                  <p:par>
-                    <p:cTn id="3" fill="hold">
-                      <p:stCondLst>
-                        <p:cond delay="indefinite"/>
-                      </p:stCondLst>
-                      <p:childTnLst>
-                        <p:par>
-                          <p:cTn id="4" fill="hold">
-                            <p:stCondLst>
-                              <p:cond delay="0"/>
-                            </p:stCondLst>
-                            <p:childTnLst>
-                              <p:par>
-                                <p:cTn id="5" presetID="10" presetClass="entr" presetSubtype="0" fill="hold" grpId="0" nodeType="clickEffect">
-                                  <p:stCondLst>
-                                    <p:cond delay="0"/>
-                                  </p:stCondLst>
-                                  <p:childTnLst>
-                                    <p:set>
-                                      <p:cBhvr>
-                                        <p:cTn id="6" dur="1" fill="hold">
-                                          <p:stCondLst>
-                                            <p:cond delay="0"/>
-                                          </p:stCondLst>
-                                        </p:cTn>
-                                        <p:tgtEl>
-                                          <p:spTgt spid="5"/>
-                                        </p:tgtEl>
-                                        <p:attrNameLst>
-                                          <p:attrName>style.visibility</p:attrName>
-                                        </p:attrNameLst>
-                                      </p:cBhvr>
-                                      <p:to>
-                                        <p:strVal val="visible"/>
-                                      </p:to>
-                                    </p:set>
-                                    <p:animEffect transition="in" filter="fade">
-                                      <p:cBhvr>
-                                        <p:cTn id="7" dur="500"/>
-                                        <p:tgtEl>
-                                          <p:spTgt spid="5"/>
-                                        </p:tgtEl>
-                                      </p:cBhvr>
-                                    </p:animEffect>
-                                  </p:childTnLst>
-                                </p:cTn>
-                              </p:par>
-                            </p:childTnLst>
-                          </p:cTn>
-                        </p:par>
-                      </p:childTnLst>
-                    </p:cTn>
-                  </p:par>
-                </p:childTnLst>
-              </p:cTn>
-              <p:prevCondLst>
-                <p:cond evt="onPrev" delay="0">
-                  <p:tgtEl>
-                    <p:sldTgt/>
-                  </p:tgtEl>
-                </p:cond>
-              </p:prevCondLst>
-              <p:nextCondLst>
-                <p:cond evt="onNext" delay="0">
-                  <p:tgtEl>
-                    <p:sldTgt/>
-                  </p:tgtEl>
-                </p:cond>
-              </p:nextCondLst>
-            </p:seq>
-          </p:childTnLst>
-        </p:cTn>
-      </p:par>
-    </p:tnLst>
-    <p:bldLst>
-      <p:bldP spid="5" grpId="0" animBg="1"/>
-    </p:bldLst>
-  </p:timing>
 </p:sld>
 </file>
 
@@ -6647,110 +8727,16 @@
         <a:srgbClr val="954F72"/>
       </a:folHlink>
     </a:clrScheme>
-    <a:fontScheme name="Office">
+    <a:fontScheme name="自定义 1">
       <a:majorFont>
-        <a:latin typeface="等线 Light" panose="020F0302020204030204"/>
-        <a:ea typeface=""/>
+        <a:latin typeface="Times New Roman"/>
+        <a:ea typeface="宋体"/>
         <a:cs typeface=""/>
-        <a:font script="Jpan" typeface="游ゴシック Light"/>
-        <a:font script="Hang" typeface="맑은 고딕"/>
-        <a:font script="Hans" typeface="等线 Light"/>
-        <a:font script="Hant" typeface="新細明體"/>
-        <a:font script="Arab" typeface="Times New Roman"/>
-        <a:font script="Hebr" typeface="Times New Roman"/>
-        <a:font script="Thai" typeface="Angsana New"/>
-        <a:font script="Ethi" typeface="Nyala"/>
-        <a:font script="Beng" typeface="Vrinda"/>
-        <a:font script="Gujr" typeface="Shruti"/>
-        <a:font script="Khmr" typeface="MoolBoran"/>
-        <a:font script="Knda" typeface="Tunga"/>
-        <a:font script="Guru" typeface="Raavi"/>
-        <a:font script="Cans" typeface="Euphemia"/>
-        <a:font script="Cher" typeface="Plantagenet Cherokee"/>
-        <a:font script="Yiii" typeface="Microsoft Yi Baiti"/>
-        <a:font script="Tibt" typeface="Microsoft Himalaya"/>
-        <a:font script="Thaa" typeface="MV Boli"/>
-        <a:font script="Deva" typeface="Mangal"/>
-        <a:font script="Telu" typeface="Gautami"/>
-        <a:font script="Taml" typeface="Latha"/>
-        <a:font script="Syrc" typeface="Estrangelo Edessa"/>
-        <a:font script="Orya" typeface="Kalinga"/>
-        <a:font script="Mlym" typeface="Kartika"/>
-        <a:font script="Laoo" typeface="DokChampa"/>
-        <a:font script="Sinh" typeface="Iskoola Pota"/>
-        <a:font script="Mong" typeface="Mongolian Baiti"/>
-        <a:font script="Viet" typeface="Times New Roman"/>
-        <a:font script="Uigh" typeface="Microsoft Uighur"/>
-        <a:font script="Geor" typeface="Sylfaen"/>
-        <a:font script="Armn" typeface="Arial"/>
-        <a:font script="Bugi" typeface="Leelawadee UI"/>
-        <a:font script="Bopo" typeface="Microsoft JhengHei"/>
-        <a:font script="Java" typeface="Javanese Text"/>
-        <a:font script="Lisu" typeface="Segoe UI"/>
-        <a:font script="Mymr" typeface="Myanmar Text"/>
-        <a:font script="Nkoo" typeface="Ebrima"/>
-        <a:font script="Olck" typeface="Nirmala UI"/>
-        <a:font script="Osma" typeface="Ebrima"/>
-        <a:font script="Phag" typeface="Phagspa"/>
-        <a:font script="Syrn" typeface="Estrangelo Edessa"/>
-        <a:font script="Syrj" typeface="Estrangelo Edessa"/>
-        <a:font script="Syre" typeface="Estrangelo Edessa"/>
-        <a:font script="Sora" typeface="Nirmala UI"/>
-        <a:font script="Tale" typeface="Microsoft Tai Le"/>
-        <a:font script="Talu" typeface="Microsoft New Tai Lue"/>
-        <a:font script="Tfng" typeface="Ebrima"/>
       </a:majorFont>
       <a:minorFont>
-        <a:latin typeface="等线" panose="020F0502020204030204"/>
-        <a:ea typeface=""/>
+        <a:latin typeface="Times New Roman"/>
+        <a:ea typeface="宋体"/>
         <a:cs typeface=""/>
-        <a:font script="Jpan" typeface="游ゴシック"/>
-        <a:font script="Hang" typeface="맑은 고딕"/>
-        <a:font script="Hans" typeface="等线"/>
-        <a:font script="Hant" typeface="新細明體"/>
-        <a:font script="Arab" typeface="Arial"/>
-        <a:font script="Hebr" typeface="Arial"/>
-        <a:font script="Thai" typeface="Cordia New"/>
-        <a:font script="Ethi" typeface="Nyala"/>
-        <a:font script="Beng" typeface="Vrinda"/>
-        <a:font script="Gujr" typeface="Shruti"/>
-        <a:font script="Khmr" typeface="DaunPenh"/>
-        <a:font script="Knda" typeface="Tunga"/>
-        <a:font script="Guru" typeface="Raavi"/>
-        <a:font script="Cans" typeface="Euphemia"/>
-        <a:font script="Cher" typeface="Plantagenet Cherokee"/>
-        <a:font script="Yiii" typeface="Microsoft Yi Baiti"/>
-        <a:font script="Tibt" typeface="Microsoft Himalaya"/>
-        <a:font script="Thaa" typeface="MV Boli"/>
-        <a:font script="Deva" typeface="Mangal"/>
-        <a:font script="Telu" typeface="Gautami"/>
-        <a:font script="Taml" typeface="Latha"/>
-        <a:font script="Syrc" typeface="Estrangelo Edessa"/>
-        <a:font script="Orya" typeface="Kalinga"/>
-        <a:font script="Mlym" typeface="Kartika"/>
-        <a:font script="Laoo" typeface="DokChampa"/>
-        <a:font script="Sinh" typeface="Iskoola Pota"/>
-        <a:font script="Mong" typeface="Mongolian Baiti"/>
-        <a:font script="Viet" typeface="Arial"/>
-        <a:font script="Uigh" typeface="Microsoft Uighur"/>
-        <a:font script="Geor" typeface="Sylfaen"/>
-        <a:font script="Armn" typeface="Arial"/>
-        <a:font script="Bugi" typeface="Leelawadee UI"/>
-        <a:font script="Bopo" typeface="Microsoft JhengHei"/>
-        <a:font script="Java" typeface="Javanese Text"/>
-        <a:font script="Lisu" typeface="Segoe UI"/>
-        <a:font script="Mymr" typeface="Myanmar Text"/>
-        <a:font script="Nkoo" typeface="Ebrima"/>
-        <a:font script="Olck" typeface="Nirmala UI"/>
-        <a:font script="Osma" typeface="Ebrima"/>
-        <a:font script="Phag" typeface="Phagspa"/>
-        <a:font script="Syrn" typeface="Estrangelo Edessa"/>
-        <a:font script="Syrj" typeface="Estrangelo Edessa"/>
-        <a:font script="Syre" typeface="Estrangelo Edessa"/>
-        <a:font script="Sora" typeface="Nirmala UI"/>
-        <a:font script="Tale" typeface="Microsoft Tai Le"/>
-        <a:font script="Talu" typeface="Microsoft New Tai Lue"/>
-        <a:font script="Tfng" typeface="Ebrima"/>
       </a:minorFont>
     </a:fontScheme>
     <a:fmtScheme name="Office">

</xml_diff>